<commit_message>
updated week 1 ppt for Rafa - dc
</commit_message>
<xml_diff>
--- a/benchmarks/Update_Rafa_1.pptx
+++ b/benchmarks/Update_Rafa_1.pptx
@@ -7,13 +7,9 @@
   <p:sldIdLst>
     <p:sldId id="256" r:id="rId2"/>
     <p:sldId id="257" r:id="rId3"/>
-    <p:sldId id="258" r:id="rId4"/>
-    <p:sldId id="259" r:id="rId5"/>
-    <p:sldId id="260" r:id="rId6"/>
-    <p:sldId id="261" r:id="rId7"/>
-    <p:sldId id="262" r:id="rId8"/>
-    <p:sldId id="263" r:id="rId9"/>
-    <p:sldId id="264" r:id="rId10"/>
+    <p:sldId id="265" r:id="rId4"/>
+    <p:sldId id="264" r:id="rId5"/>
+    <p:sldId id="266" r:id="rId6"/>
   </p:sldIdLst>
   <p:sldSz cx="9144000" cy="6858000" type="screen4x3"/>
   <p:notesSz cx="6858000" cy="9144000"/>
@@ -296,7 +292,7 @@
           <a:p>
             <a:fld id="{8A1380EC-629E-5848-BEE6-91E483A64CBC}" type="datetimeFigureOut">
               <a:rPr lang="en-US" smtClean="0"/>
-              <a:t>4/4/17</a:t>
+              <a:t>4/5/17</a:t>
             </a:fld>
             <a:endParaRPr lang="en-US"/>
           </a:p>
@@ -466,7 +462,7 @@
           <a:p>
             <a:fld id="{8A1380EC-629E-5848-BEE6-91E483A64CBC}" type="datetimeFigureOut">
               <a:rPr lang="en-US" smtClean="0"/>
-              <a:t>4/4/17</a:t>
+              <a:t>4/5/17</a:t>
             </a:fld>
             <a:endParaRPr lang="en-US"/>
           </a:p>
@@ -646,7 +642,7 @@
           <a:p>
             <a:fld id="{8A1380EC-629E-5848-BEE6-91E483A64CBC}" type="datetimeFigureOut">
               <a:rPr lang="en-US" smtClean="0"/>
-              <a:t>4/4/17</a:t>
+              <a:t>4/5/17</a:t>
             </a:fld>
             <a:endParaRPr lang="en-US"/>
           </a:p>
@@ -816,7 +812,7 @@
           <a:p>
             <a:fld id="{8A1380EC-629E-5848-BEE6-91E483A64CBC}" type="datetimeFigureOut">
               <a:rPr lang="en-US" smtClean="0"/>
-              <a:t>4/4/17</a:t>
+              <a:t>4/5/17</a:t>
             </a:fld>
             <a:endParaRPr lang="en-US"/>
           </a:p>
@@ -1062,7 +1058,7 @@
           <a:p>
             <a:fld id="{8A1380EC-629E-5848-BEE6-91E483A64CBC}" type="datetimeFigureOut">
               <a:rPr lang="en-US" smtClean="0"/>
-              <a:t>4/4/17</a:t>
+              <a:t>4/5/17</a:t>
             </a:fld>
             <a:endParaRPr lang="en-US"/>
           </a:p>
@@ -1350,7 +1346,7 @@
           <a:p>
             <a:fld id="{8A1380EC-629E-5848-BEE6-91E483A64CBC}" type="datetimeFigureOut">
               <a:rPr lang="en-US" smtClean="0"/>
-              <a:t>4/4/17</a:t>
+              <a:t>4/5/17</a:t>
             </a:fld>
             <a:endParaRPr lang="en-US"/>
           </a:p>
@@ -1772,7 +1768,7 @@
           <a:p>
             <a:fld id="{8A1380EC-629E-5848-BEE6-91E483A64CBC}" type="datetimeFigureOut">
               <a:rPr lang="en-US" smtClean="0"/>
-              <a:t>4/4/17</a:t>
+              <a:t>4/5/17</a:t>
             </a:fld>
             <a:endParaRPr lang="en-US"/>
           </a:p>
@@ -1890,7 +1886,7 @@
           <a:p>
             <a:fld id="{8A1380EC-629E-5848-BEE6-91E483A64CBC}" type="datetimeFigureOut">
               <a:rPr lang="en-US" smtClean="0"/>
-              <a:t>4/4/17</a:t>
+              <a:t>4/5/17</a:t>
             </a:fld>
             <a:endParaRPr lang="en-US"/>
           </a:p>
@@ -1985,7 +1981,7 @@
           <a:p>
             <a:fld id="{8A1380EC-629E-5848-BEE6-91E483A64CBC}" type="datetimeFigureOut">
               <a:rPr lang="en-US" smtClean="0"/>
-              <a:t>4/4/17</a:t>
+              <a:t>4/5/17</a:t>
             </a:fld>
             <a:endParaRPr lang="en-US"/>
           </a:p>
@@ -2262,7 +2258,7 @@
           <a:p>
             <a:fld id="{8A1380EC-629E-5848-BEE6-91E483A64CBC}" type="datetimeFigureOut">
               <a:rPr lang="en-US" smtClean="0"/>
-              <a:t>4/4/17</a:t>
+              <a:t>4/5/17</a:t>
             </a:fld>
             <a:endParaRPr lang="en-US"/>
           </a:p>
@@ -2515,7 +2511,7 @@
           <a:p>
             <a:fld id="{8A1380EC-629E-5848-BEE6-91E483A64CBC}" type="datetimeFigureOut">
               <a:rPr lang="en-US" smtClean="0"/>
-              <a:t>4/4/17</a:t>
+              <a:t>4/5/17</a:t>
             </a:fld>
             <a:endParaRPr lang="en-US"/>
           </a:p>
@@ -2728,7 +2724,7 @@
           <a:p>
             <a:fld id="{8A1380EC-629E-5848-BEE6-91E483A64CBC}" type="datetimeFigureOut">
               <a:rPr lang="en-US" smtClean="0"/>
-              <a:t>4/4/17</a:t>
+              <a:t>4/5/17</a:t>
             </a:fld>
             <a:endParaRPr lang="en-US"/>
           </a:p>
@@ -3138,7 +3134,7 @@
               <a:t>Highly Parallelized Image Recognition via </a:t>
             </a:r>
             <a:r>
-              <a:rPr lang="en-US" sz="2000" dirty="0" err="1" smtClean="0">
+              <a:rPr lang="en-US" sz="2000" dirty="0" smtClean="0">
                 <a:solidFill>
                   <a:schemeClr val="tx2">
                     <a:lumMod val="50000"/>
@@ -3147,7 +3143,7 @@
                 <a:latin typeface="Avenir Roman"/>
                 <a:cs typeface="Avenir Roman"/>
               </a:rPr>
-              <a:t>TensorFlow</a:t>
+              <a:t>Spark + MPI</a:t>
             </a:r>
             <a:endParaRPr lang="en-US" sz="2000" dirty="0" smtClean="0">
               <a:solidFill>
@@ -3386,7 +3382,7 @@
         <p:spPr>
           <a:xfrm>
             <a:off x="498593" y="426815"/>
-            <a:ext cx="7328370" cy="646331"/>
+            <a:ext cx="7328370" cy="369332"/>
           </a:xfrm>
           <a:prstGeom prst="rect">
             <a:avLst/>
@@ -3400,7 +3396,7 @@
           <a:lstStyle/>
           <a:p>
             <a:r>
-              <a:rPr lang="en-US" dirty="0" err="1" smtClean="0">
+              <a:rPr lang="en-US" dirty="0" smtClean="0">
                 <a:solidFill>
                   <a:schemeClr val="tx2">
                     <a:lumMod val="50000"/>
@@ -3409,105 +3405,157 @@
                 <a:latin typeface="Avenir Roman"/>
                 <a:cs typeface="Avenir Roman"/>
               </a:rPr>
-              <a:t>TensorFlow</a:t>
-            </a:r>
-            <a:r>
-              <a:rPr lang="en-US" dirty="0" smtClean="0">
-                <a:solidFill>
-                  <a:schemeClr val="tx2">
-                    <a:lumMod val="50000"/>
-                  </a:schemeClr>
-                </a:solidFill>
-                <a:latin typeface="Avenir Roman"/>
-                <a:cs typeface="Avenir Roman"/>
-              </a:rPr>
-              <a:t> is a software package that allows users to train a convolutional neural network (CNN) for image recognition. </a:t>
-            </a:r>
-          </a:p>
-        </p:txBody>
-      </p:sp>
-      <p:sp>
-        <p:nvSpPr>
-          <p:cNvPr id="4" name="Rectangle 3"/>
-          <p:cNvSpPr/>
+              <a:t>Image Recognition is a rapidly developing area of research.</a:t>
+            </a:r>
+            <a:endParaRPr lang="en-US" dirty="0" smtClean="0">
+              <a:solidFill>
+                <a:schemeClr val="tx2">
+                  <a:lumMod val="50000"/>
+                </a:schemeClr>
+              </a:solidFill>
+              <a:latin typeface="Avenir Roman"/>
+              <a:cs typeface="Avenir Roman"/>
+            </a:endParaRPr>
+          </a:p>
+        </p:txBody>
+      </p:sp>
+      <p:sp>
+        <p:nvSpPr>
+          <p:cNvPr id="8" name="TextBox 7"/>
+          <p:cNvSpPr txBox="1"/>
           <p:nvPr/>
         </p:nvSpPr>
         <p:spPr>
           <a:xfrm>
-            <a:off x="4901258" y="6454872"/>
-            <a:ext cx="4120445" cy="307777"/>
+            <a:off x="498593" y="1134558"/>
+            <a:ext cx="7328370" cy="338554"/>
           </a:xfrm>
           <a:prstGeom prst="rect">
             <a:avLst/>
           </a:prstGeom>
+          <a:noFill/>
         </p:spPr>
         <p:txBody>
-          <a:bodyPr wrap="square">
+          <a:bodyPr wrap="square" rtlCol="0">
             <a:spAutoFit/>
           </a:bodyPr>
           <a:lstStyle/>
           <a:p>
-            <a:pPr algn="r"/>
-            <a:r>
-              <a:rPr lang="en-US" sz="1400" dirty="0" smtClean="0">
-                <a:solidFill>
-                  <a:schemeClr val="accent2">
-                    <a:lumMod val="50000"/>
-                  </a:schemeClr>
-                </a:solidFill>
-                <a:latin typeface="Avenir Oblique"/>
-                <a:cs typeface="Avenir Oblique"/>
+            <a:r>
+              <a:rPr lang="en-US" sz="1600" dirty="0" smtClean="0">
+                <a:solidFill>
+                  <a:srgbClr val="632523"/>
+                </a:solidFill>
+                <a:latin typeface="Avenir Roman"/>
+                <a:cs typeface="Avenir Roman"/>
               </a:rPr>
-              <a:t>https://</a:t>
-            </a:r>
-            <a:r>
-              <a:rPr lang="en-US" sz="1400" dirty="0" err="1" smtClean="0">
-                <a:solidFill>
-                  <a:schemeClr val="accent2">
-                    <a:lumMod val="50000"/>
-                  </a:schemeClr>
-                </a:solidFill>
-                <a:latin typeface="Avenir Oblique"/>
-                <a:cs typeface="Avenir Oblique"/>
+              <a:t>Image </a:t>
+            </a:r>
+            <a:r>
+              <a:rPr lang="en-US" sz="1600">
+                <a:solidFill>
+                  <a:srgbClr val="632523"/>
+                </a:solidFill>
+                <a:latin typeface="Avenir Roman"/>
+                <a:cs typeface="Avenir Roman"/>
               </a:rPr>
-              <a:t>www.worldcommunitygrid.org</a:t>
-            </a:r>
-            <a:endParaRPr lang="en-US" sz="1400" dirty="0">
+              <a:t>r</a:t>
+            </a:r>
+            <a:r>
+              <a:rPr lang="en-US" sz="1600" smtClean="0">
+                <a:solidFill>
+                  <a:srgbClr val="632523"/>
+                </a:solidFill>
+                <a:latin typeface="Avenir Roman"/>
+                <a:cs typeface="Avenir Roman"/>
+              </a:rPr>
+              <a:t>ecognition is </a:t>
+            </a:r>
+            <a:r>
+              <a:rPr lang="en-US" sz="1600" dirty="0" smtClean="0">
+                <a:solidFill>
+                  <a:srgbClr val="632523"/>
+                </a:solidFill>
+                <a:latin typeface="Avenir Roman"/>
+                <a:cs typeface="Avenir Roman"/>
+              </a:rPr>
+              <a:t>based in optimization/machine learning algorithms </a:t>
+            </a:r>
+            <a:endParaRPr lang="en-US" sz="1600" dirty="0" smtClean="0">
               <a:solidFill>
-                <a:schemeClr val="accent2">
-                  <a:lumMod val="50000"/>
-                </a:schemeClr>
+                <a:srgbClr val="632523"/>
               </a:solidFill>
-              <a:latin typeface="Avenir Oblique"/>
-              <a:cs typeface="Avenir Oblique"/>
+              <a:latin typeface="Avenir Roman"/>
+              <a:cs typeface="Avenir Roman"/>
             </a:endParaRPr>
           </a:p>
         </p:txBody>
       </p:sp>
       <p:pic>
         <p:nvPicPr>
-          <p:cNvPr id="5" name="Picture 4"/>
+          <p:cNvPr id="3" name="Picture 2"/>
           <p:cNvPicPr>
             <a:picLocks noChangeAspect="1"/>
           </p:cNvPicPr>
           <p:nvPr/>
         </p:nvPicPr>
-        <p:blipFill>
+        <p:blipFill rotWithShape="1">
           <a:blip r:embed="rId2"/>
-          <a:stretch>
-            <a:fillRect/>
-          </a:stretch>
+          <a:srcRect t="37472" b="4632"/>
+          <a:stretch/>
         </p:blipFill>
         <p:spPr>
           <a:xfrm>
-            <a:off x="284465" y="2051715"/>
-            <a:ext cx="8633758" cy="2912344"/>
+            <a:off x="330507" y="2075943"/>
+            <a:ext cx="8505263" cy="1778879"/>
           </a:xfrm>
           <a:prstGeom prst="rect">
             <a:avLst/>
           </a:prstGeom>
         </p:spPr>
       </p:pic>
+      <p:sp>
+        <p:nvSpPr>
+          <p:cNvPr id="10" name="TextBox 9"/>
+          <p:cNvSpPr txBox="1"/>
+          <p:nvPr/>
+        </p:nvSpPr>
+        <p:spPr>
+          <a:xfrm>
+            <a:off x="650993" y="5032100"/>
+            <a:ext cx="7328370" cy="338554"/>
+          </a:xfrm>
+          <a:prstGeom prst="rect">
+            <a:avLst/>
+          </a:prstGeom>
+          <a:noFill/>
+        </p:spPr>
+        <p:txBody>
+          <a:bodyPr wrap="square" rtlCol="0">
+            <a:spAutoFit/>
+          </a:bodyPr>
+          <a:lstStyle/>
+          <a:p>
+            <a:r>
+              <a:rPr lang="en-US" sz="1600" dirty="0" smtClean="0">
+                <a:solidFill>
+                  <a:srgbClr val="632523"/>
+                </a:solidFill>
+                <a:latin typeface="Avenir Roman"/>
+                <a:cs typeface="Avenir Roman"/>
+              </a:rPr>
+              <a:t>Can be further developed by adding more layers – e.g. a neural network</a:t>
+            </a:r>
+            <a:endParaRPr lang="en-US" sz="1600" dirty="0" smtClean="0">
+              <a:solidFill>
+                <a:srgbClr val="632523"/>
+              </a:solidFill>
+              <a:latin typeface="Avenir Roman"/>
+              <a:cs typeface="Avenir Roman"/>
+            </a:endParaRPr>
+          </a:p>
+        </p:txBody>
+      </p:sp>
     </p:spTree>
     <p:extLst>
       <p:ext uri="{BB962C8B-B14F-4D97-AF65-F5344CB8AC3E}">
@@ -3570,14 +3618,23 @@
                 <a:latin typeface="Avenir Roman"/>
                 <a:cs typeface="Avenir Roman"/>
               </a:rPr>
-              <a:t>A filter (or neuron) in the CNN passes over a region of the image, and computes a dot product.</a:t>
-            </a:r>
+              <a:t>We plan to leverage the framework of Spark and MPI to train 60,000 images of written digits for image recognition.</a:t>
+            </a:r>
+            <a:endParaRPr lang="en-US" dirty="0" smtClean="0">
+              <a:solidFill>
+                <a:schemeClr val="tx2">
+                  <a:lumMod val="50000"/>
+                </a:schemeClr>
+              </a:solidFill>
+              <a:latin typeface="Avenir Roman"/>
+              <a:cs typeface="Avenir Roman"/>
+            </a:endParaRPr>
           </a:p>
         </p:txBody>
       </p:sp>
       <p:pic>
         <p:nvPicPr>
-          <p:cNvPr id="4" name="Picture 3"/>
+          <p:cNvPr id="3" name="Picture 2"/>
           <p:cNvPicPr>
             <a:picLocks noChangeAspect="1"/>
           </p:cNvPicPr>
@@ -3591,103 +3648,24 @@
         </p:blipFill>
         <p:spPr>
           <a:xfrm>
-            <a:off x="393229" y="1494620"/>
-            <a:ext cx="3167329" cy="2225322"/>
+            <a:off x="2660276" y="1661283"/>
+            <a:ext cx="3225800" cy="3378200"/>
           </a:xfrm>
           <a:prstGeom prst="rect">
             <a:avLst/>
           </a:prstGeom>
         </p:spPr>
       </p:pic>
-      <p:pic>
-        <p:nvPicPr>
-          <p:cNvPr id="5" name="Picture 4"/>
-          <p:cNvPicPr>
-            <a:picLocks noChangeAspect="1"/>
-          </p:cNvPicPr>
+      <p:sp>
+        <p:nvSpPr>
+          <p:cNvPr id="4" name="TextBox 3"/>
+          <p:cNvSpPr txBox="1"/>
           <p:nvPr/>
-        </p:nvPicPr>
-        <p:blipFill>
-          <a:blip r:embed="rId3"/>
-          <a:stretch>
-            <a:fillRect/>
-          </a:stretch>
-        </p:blipFill>
+        </p:nvSpPr>
         <p:spPr>
           <a:xfrm>
-            <a:off x="4515557" y="1411110"/>
-            <a:ext cx="4046596" cy="2308832"/>
-          </a:xfrm>
-          <a:prstGeom prst="rect">
-            <a:avLst/>
-          </a:prstGeom>
-        </p:spPr>
-      </p:pic>
-      <p:cxnSp>
-        <p:nvCxnSpPr>
-          <p:cNvPr id="7" name="Straight Connector 6"/>
-          <p:cNvCxnSpPr/>
-          <p:nvPr/>
-        </p:nvCxnSpPr>
-        <p:spPr>
-          <a:xfrm>
-            <a:off x="4158074" y="1259434"/>
-            <a:ext cx="0" cy="2460508"/>
-          </a:xfrm>
-          <a:prstGeom prst="line">
-            <a:avLst/>
-          </a:prstGeom>
-          <a:effectLst/>
-        </p:spPr>
-        <p:style>
-          <a:lnRef idx="2">
-            <a:schemeClr val="accent1"/>
-          </a:lnRef>
-          <a:fillRef idx="0">
-            <a:schemeClr val="accent1"/>
-          </a:fillRef>
-          <a:effectRef idx="1">
-            <a:schemeClr val="accent1"/>
-          </a:effectRef>
-          <a:fontRef idx="minor">
-            <a:schemeClr val="tx1"/>
-          </a:fontRef>
-        </p:style>
-      </p:cxnSp>
-      <p:pic>
-        <p:nvPicPr>
-          <p:cNvPr id="8" name="Picture 7"/>
-          <p:cNvPicPr>
-            <a:picLocks noChangeAspect="1"/>
-          </p:cNvPicPr>
-          <p:nvPr/>
-        </p:nvPicPr>
-        <p:blipFill>
-          <a:blip r:embed="rId4"/>
-          <a:stretch>
-            <a:fillRect/>
-          </a:stretch>
-        </p:blipFill>
-        <p:spPr>
-          <a:xfrm>
-            <a:off x="1444508" y="4210116"/>
-            <a:ext cx="5916319" cy="2340107"/>
-          </a:xfrm>
-          <a:prstGeom prst="rect">
-            <a:avLst/>
-          </a:prstGeom>
-        </p:spPr>
-      </p:pic>
-      <p:sp>
-        <p:nvSpPr>
-          <p:cNvPr id="9" name="TextBox 8"/>
-          <p:cNvSpPr txBox="1"/>
-          <p:nvPr/>
-        </p:nvSpPr>
-        <p:spPr>
-          <a:xfrm rot="16200000">
-            <a:off x="1374564" y="2791480"/>
-            <a:ext cx="1081572" cy="369332"/>
+            <a:off x="498593" y="1481989"/>
+            <a:ext cx="2564348" cy="338554"/>
           </a:xfrm>
           <a:prstGeom prst="rect">
             <a:avLst/>
@@ -3701,28 +3679,35 @@
           <a:lstStyle/>
           <a:p>
             <a:r>
-              <a:rPr lang="en-US" dirty="0" smtClean="0">
+              <a:rPr lang="en-US" sz="1600" dirty="0" smtClean="0">
                 <a:solidFill>
                   <a:srgbClr val="632523"/>
                 </a:solidFill>
                 <a:latin typeface="Avenir Roman"/>
                 <a:cs typeface="Avenir Roman"/>
               </a:rPr>
-              <a:t>filter 1</a:t>
-            </a:r>
-          </a:p>
-        </p:txBody>
-      </p:sp>
-      <p:sp>
-        <p:nvSpPr>
-          <p:cNvPr id="10" name="TextBox 9"/>
+              <a:t>Example image</a:t>
+            </a:r>
+            <a:endParaRPr lang="en-US" sz="1600" dirty="0" smtClean="0">
+              <a:solidFill>
+                <a:srgbClr val="632523"/>
+              </a:solidFill>
+              <a:latin typeface="Avenir Roman"/>
+              <a:cs typeface="Avenir Roman"/>
+            </a:endParaRPr>
+          </a:p>
+        </p:txBody>
+      </p:sp>
+      <p:sp>
+        <p:nvSpPr>
+          <p:cNvPr id="5" name="TextBox 4"/>
           <p:cNvSpPr txBox="1"/>
           <p:nvPr/>
         </p:nvSpPr>
         <p:spPr>
           <a:xfrm>
-            <a:off x="393229" y="4782965"/>
-            <a:ext cx="995584" cy="369332"/>
+            <a:off x="650992" y="5294977"/>
+            <a:ext cx="5773714" cy="338554"/>
           </a:xfrm>
           <a:prstGeom prst="rect">
             <a:avLst/>
@@ -3736,28 +3721,35 @@
           <a:lstStyle/>
           <a:p>
             <a:r>
-              <a:rPr lang="en-US" dirty="0" smtClean="0">
+              <a:rPr lang="en-US" sz="1600" dirty="0" smtClean="0">
                 <a:solidFill>
                   <a:srgbClr val="632523"/>
                 </a:solidFill>
                 <a:latin typeface="Avenir Roman"/>
                 <a:cs typeface="Avenir Roman"/>
               </a:rPr>
-              <a:t>filter 4</a:t>
-            </a:r>
-          </a:p>
-        </p:txBody>
-      </p:sp>
-      <p:sp>
-        <p:nvSpPr>
-          <p:cNvPr id="11" name="TextBox 10"/>
+              <a:t>Have to train 10 separate digits using 60,000 examples</a:t>
+            </a:r>
+            <a:endParaRPr lang="en-US" sz="1600" dirty="0" smtClean="0">
+              <a:solidFill>
+                <a:srgbClr val="632523"/>
+              </a:solidFill>
+              <a:latin typeface="Avenir Roman"/>
+              <a:cs typeface="Avenir Roman"/>
+            </a:endParaRPr>
+          </a:p>
+        </p:txBody>
+      </p:sp>
+      <p:sp>
+        <p:nvSpPr>
+          <p:cNvPr id="6" name="TextBox 5"/>
           <p:cNvSpPr txBox="1"/>
           <p:nvPr/>
         </p:nvSpPr>
         <p:spPr>
           <a:xfrm>
-            <a:off x="2104865" y="2933151"/>
-            <a:ext cx="474368" cy="369332"/>
+            <a:off x="997627" y="5785931"/>
+            <a:ext cx="5773714" cy="830997"/>
           </a:xfrm>
           <a:prstGeom prst="rect">
             <a:avLst/>
@@ -3771,16 +3763,48 @@
           <a:lstStyle/>
           <a:p>
             <a:r>
-              <a:rPr lang="is-IS" dirty="0" smtClean="0">
+              <a:rPr lang="en-US" sz="1600" dirty="0" smtClean="0">
+                <a:solidFill>
+                  <a:srgbClr val="632523"/>
+                </a:solidFill>
+                <a:latin typeface="Avenir Black"/>
+                <a:cs typeface="Avenir Black"/>
+              </a:rPr>
+              <a:t>data parallelism</a:t>
+            </a:r>
+            <a:r>
+              <a:rPr lang="en-US" sz="1600" dirty="0" smtClean="0">
                 <a:solidFill>
                   <a:srgbClr val="632523"/>
                 </a:solidFill>
                 <a:latin typeface="Avenir Roman"/>
                 <a:cs typeface="Avenir Roman"/>
               </a:rPr>
-              <a:t>…</a:t>
-            </a:r>
-            <a:endParaRPr lang="en-US" dirty="0" smtClean="0">
+              <a:t>: use MPI to break up training set, and train separate models – combine optimal weights</a:t>
+            </a:r>
+          </a:p>
+          <a:p>
+            <a:r>
+              <a:rPr lang="en-US" sz="1600" dirty="0" smtClean="0">
+                <a:solidFill>
+                  <a:srgbClr val="632523"/>
+                </a:solidFill>
+                <a:latin typeface="Avenir Black"/>
+                <a:cs typeface="Avenir Black"/>
+              </a:rPr>
+              <a:t>model parallelism</a:t>
+            </a:r>
+            <a:r>
+              <a:rPr lang="en-US" sz="1600" dirty="0" smtClean="0">
+                <a:solidFill>
+                  <a:srgbClr val="632523"/>
+                </a:solidFill>
+                <a:latin typeface="Avenir Roman"/>
+                <a:cs typeface="Avenir Roman"/>
+              </a:rPr>
+              <a:t>: use MPI to train each digit separately</a:t>
+            </a:r>
+            <a:endParaRPr lang="en-US" sz="1600" dirty="0" smtClean="0">
               <a:solidFill>
                 <a:srgbClr val="632523"/>
               </a:solidFill>
@@ -3790,181 +3814,10 @@
           </a:p>
         </p:txBody>
       </p:sp>
-      <p:sp>
-        <p:nvSpPr>
-          <p:cNvPr id="12" name="Rectangle 11"/>
-          <p:cNvSpPr/>
-          <p:nvPr/>
-        </p:nvSpPr>
-        <p:spPr>
-          <a:xfrm>
-            <a:off x="4901258" y="6550223"/>
-            <a:ext cx="4120445" cy="307777"/>
-          </a:xfrm>
-          <a:prstGeom prst="rect">
-            <a:avLst/>
-          </a:prstGeom>
-        </p:spPr>
-        <p:txBody>
-          <a:bodyPr wrap="square">
-            <a:spAutoFit/>
-          </a:bodyPr>
-          <a:lstStyle/>
-          <a:p>
-            <a:pPr algn="r"/>
-            <a:r>
-              <a:rPr lang="en-US" sz="1400" dirty="0" smtClean="0">
-                <a:solidFill>
-                  <a:schemeClr val="accent2">
-                    <a:lumMod val="50000"/>
-                  </a:schemeClr>
-                </a:solidFill>
-                <a:latin typeface="Avenir Oblique"/>
-                <a:cs typeface="Avenir Oblique"/>
-              </a:rPr>
-              <a:t>http://cs231n.github.io/convolutional-networks/</a:t>
-            </a:r>
-            <a:endParaRPr lang="en-US" sz="1400" dirty="0">
-              <a:solidFill>
-                <a:schemeClr val="accent2">
-                  <a:lumMod val="50000"/>
-                </a:schemeClr>
-              </a:solidFill>
-              <a:latin typeface="Avenir Oblique"/>
-              <a:cs typeface="Avenir Oblique"/>
-            </a:endParaRPr>
-          </a:p>
-        </p:txBody>
-      </p:sp>
-      <p:sp>
-        <p:nvSpPr>
-          <p:cNvPr id="13" name="TextBox 12"/>
-          <p:cNvSpPr txBox="1"/>
-          <p:nvPr/>
-        </p:nvSpPr>
-        <p:spPr>
-          <a:xfrm>
-            <a:off x="445112" y="4177129"/>
-            <a:ext cx="1081572" cy="369332"/>
-          </a:xfrm>
-          <a:prstGeom prst="rect">
-            <a:avLst/>
-          </a:prstGeom>
-          <a:noFill/>
-        </p:spPr>
-        <p:txBody>
-          <a:bodyPr wrap="square" rtlCol="0">
-            <a:spAutoFit/>
-          </a:bodyPr>
-          <a:lstStyle/>
-          <a:p>
-            <a:r>
-              <a:rPr lang="en-US" dirty="0" smtClean="0">
-                <a:solidFill>
-                  <a:srgbClr val="632523"/>
-                </a:solidFill>
-                <a:latin typeface="Avenir Roman"/>
-                <a:cs typeface="Avenir Roman"/>
-              </a:rPr>
-              <a:t>filter 1</a:t>
-            </a:r>
-          </a:p>
-        </p:txBody>
-      </p:sp>
-      <p:cxnSp>
-        <p:nvCxnSpPr>
-          <p:cNvPr id="15" name="Straight Arrow Connector 14"/>
-          <p:cNvCxnSpPr/>
-          <p:nvPr/>
-        </p:nvCxnSpPr>
-        <p:spPr>
-          <a:xfrm>
-            <a:off x="1222963" y="4346222"/>
-            <a:ext cx="507721" cy="84667"/>
-          </a:xfrm>
-          <a:prstGeom prst="straightConnector1">
-            <a:avLst/>
-          </a:prstGeom>
-          <a:ln>
-            <a:solidFill>
-              <a:schemeClr val="accent2">
-                <a:lumMod val="50000"/>
-              </a:schemeClr>
-            </a:solidFill>
-            <a:tailEnd type="arrow"/>
-          </a:ln>
-          <a:effectLst>
-            <a:glow rad="101600">
-              <a:schemeClr val="bg1">
-                <a:alpha val="75000"/>
-              </a:schemeClr>
-            </a:glow>
-          </a:effectLst>
-        </p:spPr>
-        <p:style>
-          <a:lnRef idx="2">
-            <a:schemeClr val="accent1"/>
-          </a:lnRef>
-          <a:fillRef idx="0">
-            <a:schemeClr val="accent1"/>
-          </a:fillRef>
-          <a:effectRef idx="1">
-            <a:schemeClr val="accent1"/>
-          </a:effectRef>
-          <a:fontRef idx="minor">
-            <a:schemeClr val="tx1"/>
-          </a:fontRef>
-        </p:style>
-      </p:cxnSp>
-      <p:cxnSp>
-        <p:nvCxnSpPr>
-          <p:cNvPr id="16" name="Straight Arrow Connector 15"/>
-          <p:cNvCxnSpPr/>
-          <p:nvPr/>
-        </p:nvCxnSpPr>
-        <p:spPr>
-          <a:xfrm flipV="1">
-            <a:off x="1190647" y="4546461"/>
-            <a:ext cx="1612760" cy="431939"/>
-          </a:xfrm>
-          <a:prstGeom prst="straightConnector1">
-            <a:avLst/>
-          </a:prstGeom>
-          <a:ln>
-            <a:solidFill>
-              <a:schemeClr val="accent2">
-                <a:lumMod val="50000"/>
-              </a:schemeClr>
-            </a:solidFill>
-            <a:tailEnd type="arrow"/>
-          </a:ln>
-          <a:effectLst>
-            <a:glow rad="101600">
-              <a:schemeClr val="bg1">
-                <a:alpha val="75000"/>
-              </a:schemeClr>
-            </a:glow>
-          </a:effectLst>
-        </p:spPr>
-        <p:style>
-          <a:lnRef idx="2">
-            <a:schemeClr val="accent1"/>
-          </a:lnRef>
-          <a:fillRef idx="0">
-            <a:schemeClr val="accent1"/>
-          </a:fillRef>
-          <a:effectRef idx="1">
-            <a:schemeClr val="accent1"/>
-          </a:effectRef>
-          <a:fontRef idx="minor">
-            <a:schemeClr val="tx1"/>
-          </a:fontRef>
-        </p:style>
-      </p:cxnSp>
     </p:spTree>
     <p:extLst>
       <p:ext uri="{BB962C8B-B14F-4D97-AF65-F5344CB8AC3E}">
-        <p14:creationId xmlns:p14="http://schemas.microsoft.com/office/powerpoint/2010/main" val="3540492525"/>
+        <p14:creationId xmlns:p14="http://schemas.microsoft.com/office/powerpoint/2010/main" val="1036359763"/>
       </p:ext>
     </p:extLst>
   </p:cSld>
@@ -3991,175 +3844,326 @@
           <a:chExt cx="0" cy="0"/>
         </a:xfrm>
       </p:grpSpPr>
+      <p:sp>
+        <p:nvSpPr>
+          <p:cNvPr id="2" name="TextBox 1"/>
+          <p:cNvSpPr txBox="1"/>
+          <p:nvPr/>
+        </p:nvSpPr>
+        <p:spPr>
+          <a:xfrm>
+            <a:off x="404519" y="426815"/>
+            <a:ext cx="6848592" cy="369332"/>
+          </a:xfrm>
+          <a:prstGeom prst="rect">
+            <a:avLst/>
+          </a:prstGeom>
+          <a:noFill/>
+        </p:spPr>
+        <p:txBody>
+          <a:bodyPr wrap="square" rtlCol="0">
+            <a:spAutoFit/>
+          </a:bodyPr>
+          <a:lstStyle/>
+          <a:p>
+            <a:r>
+              <a:rPr lang="en-US" dirty="0" smtClean="0">
+                <a:solidFill>
+                  <a:schemeClr val="tx2">
+                    <a:lumMod val="50000"/>
+                  </a:schemeClr>
+                </a:solidFill>
+                <a:latin typeface="Avenir Roman"/>
+                <a:cs typeface="Avenir Roman"/>
+              </a:rPr>
+              <a:t>Project </a:t>
+            </a:r>
+            <a:r>
+              <a:rPr lang="en-US" dirty="0" smtClean="0">
+                <a:solidFill>
+                  <a:schemeClr val="tx2">
+                    <a:lumMod val="50000"/>
+                  </a:schemeClr>
+                </a:solidFill>
+                <a:latin typeface="Avenir Roman"/>
+                <a:cs typeface="Avenir Roman"/>
+              </a:rPr>
+              <a:t>Updates</a:t>
+            </a:r>
+            <a:endParaRPr lang="en-US" dirty="0" smtClean="0">
+              <a:solidFill>
+                <a:schemeClr val="tx2">
+                  <a:lumMod val="50000"/>
+                </a:schemeClr>
+              </a:solidFill>
+              <a:latin typeface="Avenir Roman"/>
+              <a:cs typeface="Avenir Roman"/>
+            </a:endParaRPr>
+          </a:p>
+        </p:txBody>
+      </p:sp>
+      <p:sp>
+        <p:nvSpPr>
+          <p:cNvPr id="3" name="TextBox 2"/>
+          <p:cNvSpPr txBox="1"/>
+          <p:nvPr/>
+        </p:nvSpPr>
+        <p:spPr>
+          <a:xfrm>
+            <a:off x="980252" y="1519955"/>
+            <a:ext cx="7693378" cy="1477328"/>
+          </a:xfrm>
+          <a:prstGeom prst="rect">
+            <a:avLst/>
+          </a:prstGeom>
+          <a:noFill/>
+        </p:spPr>
+        <p:txBody>
+          <a:bodyPr wrap="square" rtlCol="0">
+            <a:spAutoFit/>
+          </a:bodyPr>
+          <a:lstStyle/>
+          <a:p>
+            <a:r>
+              <a:rPr lang="en-US" dirty="0" smtClean="0">
+                <a:solidFill>
+                  <a:schemeClr val="tx2">
+                    <a:lumMod val="50000"/>
+                  </a:schemeClr>
+                </a:solidFill>
+                <a:latin typeface="Avenir Roman"/>
+                <a:cs typeface="Avenir Roman"/>
+              </a:rPr>
+              <a:t>Implemented preliminary image detection program in </a:t>
+            </a:r>
+            <a:r>
+              <a:rPr lang="en-US" dirty="0" err="1" smtClean="0">
+                <a:solidFill>
+                  <a:schemeClr val="tx2">
+                    <a:lumMod val="50000"/>
+                  </a:schemeClr>
+                </a:solidFill>
+                <a:latin typeface="Avenir Roman"/>
+                <a:cs typeface="Avenir Roman"/>
+              </a:rPr>
+              <a:t>pySpark</a:t>
+            </a:r>
+            <a:endParaRPr lang="en-US" dirty="0" smtClean="0">
+              <a:solidFill>
+                <a:schemeClr val="tx2">
+                  <a:lumMod val="50000"/>
+                </a:schemeClr>
+              </a:solidFill>
+              <a:latin typeface="Avenir Roman"/>
+              <a:cs typeface="Avenir Roman"/>
+            </a:endParaRPr>
+          </a:p>
+          <a:p>
+            <a:endParaRPr lang="en-US" dirty="0">
+              <a:solidFill>
+                <a:schemeClr val="tx2">
+                  <a:lumMod val="50000"/>
+                </a:schemeClr>
+              </a:solidFill>
+              <a:latin typeface="Avenir Roman"/>
+              <a:cs typeface="Avenir Roman"/>
+            </a:endParaRPr>
+          </a:p>
+          <a:p>
+            <a:r>
+              <a:rPr lang="en-US" dirty="0">
+                <a:solidFill>
+                  <a:schemeClr val="tx2">
+                    <a:lumMod val="50000"/>
+                  </a:schemeClr>
+                </a:solidFill>
+                <a:latin typeface="Avenir Roman"/>
+                <a:cs typeface="Avenir Roman"/>
+              </a:rPr>
+              <a:t>https://</a:t>
+            </a:r>
+            <a:r>
+              <a:rPr lang="en-US" dirty="0" err="1">
+                <a:solidFill>
+                  <a:schemeClr val="tx2">
+                    <a:lumMod val="50000"/>
+                  </a:schemeClr>
+                </a:solidFill>
+                <a:latin typeface="Avenir Roman"/>
+                <a:cs typeface="Avenir Roman"/>
+              </a:rPr>
+              <a:t>github.com</a:t>
+            </a:r>
+            <a:r>
+              <a:rPr lang="en-US" dirty="0">
+                <a:solidFill>
+                  <a:schemeClr val="tx2">
+                    <a:lumMod val="50000"/>
+                  </a:schemeClr>
+                </a:solidFill>
+                <a:latin typeface="Avenir Roman"/>
+                <a:cs typeface="Avenir Roman"/>
+              </a:rPr>
+              <a:t>/</a:t>
+            </a:r>
+            <a:r>
+              <a:rPr lang="en-US" dirty="0" err="1">
+                <a:solidFill>
+                  <a:schemeClr val="tx2">
+                    <a:lumMod val="50000"/>
+                  </a:schemeClr>
+                </a:solidFill>
+                <a:latin typeface="Avenir Roman"/>
+                <a:cs typeface="Avenir Roman"/>
+              </a:rPr>
+              <a:t>dcusworth</a:t>
+            </a:r>
+            <a:r>
+              <a:rPr lang="en-US" dirty="0">
+                <a:solidFill>
+                  <a:schemeClr val="tx2">
+                    <a:lumMod val="50000"/>
+                  </a:schemeClr>
+                </a:solidFill>
+                <a:latin typeface="Avenir Roman"/>
+                <a:cs typeface="Avenir Roman"/>
+              </a:rPr>
+              <a:t>/</a:t>
+            </a:r>
+            <a:r>
+              <a:rPr lang="en-US" dirty="0" err="1">
+                <a:solidFill>
+                  <a:schemeClr val="tx2">
+                    <a:lumMod val="50000"/>
+                  </a:schemeClr>
+                </a:solidFill>
+                <a:latin typeface="Avenir Roman"/>
+                <a:cs typeface="Avenir Roman"/>
+              </a:rPr>
+              <a:t>image_spark_mpi</a:t>
+            </a:r>
+            <a:r>
+              <a:rPr lang="en-US" dirty="0">
+                <a:solidFill>
+                  <a:schemeClr val="tx2">
+                    <a:lumMod val="50000"/>
+                  </a:schemeClr>
+                </a:solidFill>
+                <a:latin typeface="Avenir Roman"/>
+                <a:cs typeface="Avenir Roman"/>
+              </a:rPr>
+              <a:t>/blob/master/model/</a:t>
+            </a:r>
+            <a:r>
+              <a:rPr lang="en-US" dirty="0" err="1">
+                <a:solidFill>
+                  <a:schemeClr val="tx2">
+                    <a:lumMod val="50000"/>
+                  </a:schemeClr>
+                </a:solidFill>
+                <a:latin typeface="Avenir Roman"/>
+                <a:cs typeface="Avenir Roman"/>
+              </a:rPr>
+              <a:t>ML_algorithm_MNIST_CV.ipynb</a:t>
+            </a:r>
+            <a:r>
+              <a:rPr lang="en-US" dirty="0">
+                <a:solidFill>
+                  <a:schemeClr val="tx2">
+                    <a:lumMod val="50000"/>
+                  </a:schemeClr>
+                </a:solidFill>
+                <a:latin typeface="Avenir Roman"/>
+                <a:cs typeface="Avenir Roman"/>
+              </a:rPr>
+              <a:t> </a:t>
+            </a:r>
+            <a:endParaRPr lang="en-US" dirty="0" smtClean="0">
+              <a:solidFill>
+                <a:schemeClr val="tx2">
+                  <a:lumMod val="50000"/>
+                </a:schemeClr>
+              </a:solidFill>
+              <a:latin typeface="Avenir Roman"/>
+              <a:cs typeface="Avenir Roman"/>
+            </a:endParaRPr>
+          </a:p>
+          <a:p>
+            <a:endParaRPr lang="en-US" dirty="0">
+              <a:solidFill>
+                <a:schemeClr val="tx2">
+                  <a:lumMod val="50000"/>
+                </a:schemeClr>
+              </a:solidFill>
+              <a:latin typeface="Avenir Roman"/>
+              <a:cs typeface="Avenir Roman"/>
+            </a:endParaRPr>
+          </a:p>
+        </p:txBody>
+      </p:sp>
+      <p:sp>
+        <p:nvSpPr>
+          <p:cNvPr id="4" name="TextBox 3"/>
+          <p:cNvSpPr txBox="1"/>
+          <p:nvPr/>
+        </p:nvSpPr>
+        <p:spPr>
+          <a:xfrm>
+            <a:off x="679215" y="1150623"/>
+            <a:ext cx="1136415" cy="369332"/>
+          </a:xfrm>
+          <a:prstGeom prst="rect">
+            <a:avLst/>
+          </a:prstGeom>
+          <a:noFill/>
+        </p:spPr>
+        <p:txBody>
+          <a:bodyPr wrap="square" rtlCol="0">
+            <a:spAutoFit/>
+          </a:bodyPr>
+          <a:lstStyle/>
+          <a:p>
+            <a:r>
+              <a:rPr lang="en-US" dirty="0" smtClean="0">
+                <a:solidFill>
+                  <a:srgbClr val="632523"/>
+                </a:solidFill>
+                <a:latin typeface="Avenir Roman"/>
+                <a:cs typeface="Avenir Roman"/>
+              </a:rPr>
+              <a:t>Done</a:t>
+            </a:r>
+          </a:p>
+        </p:txBody>
+      </p:sp>
       <p:pic>
         <p:nvPicPr>
-          <p:cNvPr id="3" name="Picture 2" descr="Screen Shot 2017-04-04 at 10.08.40 AM.png"/>
+          <p:cNvPr id="7" name="Picture 6"/>
           <p:cNvPicPr>
             <a:picLocks noChangeAspect="1"/>
           </p:cNvPicPr>
           <p:nvPr/>
         </p:nvPicPr>
-        <p:blipFill rotWithShape="1">
-          <a:blip r:embed="rId2">
-            <a:extLst>
-              <a:ext uri="{28A0092B-C50C-407E-A947-70E740481C1C}">
-                <a14:useLocalDpi xmlns:a14="http://schemas.microsoft.com/office/drawing/2010/main" val="0"/>
-              </a:ext>
-            </a:extLst>
-          </a:blip>
-          <a:srcRect l="3660" r="2818"/>
-          <a:stretch/>
+        <p:blipFill>
+          <a:blip r:embed="rId2"/>
+          <a:stretch>
+            <a:fillRect/>
+          </a:stretch>
         </p:blipFill>
         <p:spPr>
           <a:xfrm>
-            <a:off x="169333" y="1853260"/>
-            <a:ext cx="4327526" cy="4129852"/>
+            <a:off x="2959100" y="2997283"/>
+            <a:ext cx="3225800" cy="3378200"/>
           </a:xfrm>
           <a:prstGeom prst="rect">
             <a:avLst/>
           </a:prstGeom>
         </p:spPr>
       </p:pic>
-      <p:sp>
-        <p:nvSpPr>
-          <p:cNvPr id="4" name="TextBox 3"/>
-          <p:cNvSpPr txBox="1"/>
-          <p:nvPr/>
-        </p:nvSpPr>
-        <p:spPr>
-          <a:xfrm>
-            <a:off x="404519" y="323334"/>
-            <a:ext cx="7328370" cy="646331"/>
-          </a:xfrm>
-          <a:prstGeom prst="rect">
-            <a:avLst/>
-          </a:prstGeom>
-          <a:noFill/>
-        </p:spPr>
-        <p:txBody>
-          <a:bodyPr wrap="square" rtlCol="0">
-            <a:spAutoFit/>
-          </a:bodyPr>
-          <a:lstStyle/>
-          <a:p>
-            <a:r>
-              <a:rPr lang="en-US" dirty="0" smtClean="0">
-                <a:solidFill>
-                  <a:schemeClr val="tx2">
-                    <a:lumMod val="50000"/>
-                  </a:schemeClr>
-                </a:solidFill>
-                <a:latin typeface="Avenir Roman"/>
-                <a:cs typeface="Avenir Roman"/>
-              </a:rPr>
-              <a:t>The user has to specify the size of the filter, how many pixels to “slide” the filter, and how much padding should be specified. </a:t>
-            </a:r>
-          </a:p>
-        </p:txBody>
-      </p:sp>
-      <p:sp>
-        <p:nvSpPr>
-          <p:cNvPr id="5" name="TextBox 4"/>
-          <p:cNvSpPr txBox="1"/>
-          <p:nvPr/>
-        </p:nvSpPr>
-        <p:spPr>
-          <a:xfrm>
-            <a:off x="950149" y="1266042"/>
-            <a:ext cx="2492962" cy="584776"/>
-          </a:xfrm>
-          <a:prstGeom prst="rect">
-            <a:avLst/>
-          </a:prstGeom>
-          <a:noFill/>
-        </p:spPr>
-        <p:txBody>
-          <a:bodyPr wrap="square" rtlCol="0">
-            <a:spAutoFit/>
-          </a:bodyPr>
-          <a:lstStyle/>
-          <a:p>
-            <a:r>
-              <a:rPr lang="en-US" sz="1600" dirty="0" smtClean="0">
-                <a:solidFill>
-                  <a:srgbClr val="632523"/>
-                </a:solidFill>
-                <a:latin typeface="Avenir Roman"/>
-                <a:cs typeface="Avenir Roman"/>
-              </a:rPr>
-              <a:t>filter W0 applied to a subsection of image </a:t>
-            </a:r>
-          </a:p>
-        </p:txBody>
-      </p:sp>
-      <p:pic>
-        <p:nvPicPr>
-          <p:cNvPr id="6" name="Picture 5" descr="Screen Shot 2017-04-04 at 10.11.58 AM.png"/>
-          <p:cNvPicPr>
-            <a:picLocks noChangeAspect="1"/>
-          </p:cNvPicPr>
-          <p:nvPr/>
-        </p:nvPicPr>
-        <p:blipFill rotWithShape="1">
-          <a:blip r:embed="rId3">
-            <a:extLst>
-              <a:ext uri="{28A0092B-C50C-407E-A947-70E740481C1C}">
-                <a14:useLocalDpi xmlns:a14="http://schemas.microsoft.com/office/drawing/2010/main" val="0"/>
-              </a:ext>
-            </a:extLst>
-          </a:blip>
-          <a:srcRect l="4394" r="4303"/>
-          <a:stretch/>
-        </p:blipFill>
-        <p:spPr>
-          <a:xfrm>
-            <a:off x="4496859" y="1853260"/>
-            <a:ext cx="4663339" cy="4449704"/>
-          </a:xfrm>
-          <a:prstGeom prst="rect">
-            <a:avLst/>
-          </a:prstGeom>
-        </p:spPr>
-      </p:pic>
-      <p:sp>
-        <p:nvSpPr>
-          <p:cNvPr id="7" name="TextBox 6"/>
-          <p:cNvSpPr txBox="1"/>
-          <p:nvPr/>
-        </p:nvSpPr>
-        <p:spPr>
-          <a:xfrm>
-            <a:off x="5524030" y="1266042"/>
-            <a:ext cx="2492962" cy="584776"/>
-          </a:xfrm>
-          <a:prstGeom prst="rect">
-            <a:avLst/>
-          </a:prstGeom>
-          <a:noFill/>
-        </p:spPr>
-        <p:txBody>
-          <a:bodyPr wrap="square" rtlCol="0">
-            <a:spAutoFit/>
-          </a:bodyPr>
-          <a:lstStyle/>
-          <a:p>
-            <a:r>
-              <a:rPr lang="en-US" sz="1600" dirty="0" smtClean="0">
-                <a:solidFill>
-                  <a:srgbClr val="632523"/>
-                </a:solidFill>
-                <a:latin typeface="Avenir Roman"/>
-                <a:cs typeface="Avenir Roman"/>
-              </a:rPr>
-              <a:t>filter W1 applied to a subsection of image </a:t>
-            </a:r>
-          </a:p>
-        </p:txBody>
-      </p:sp>
     </p:spTree>
     <p:extLst>
       <p:ext uri="{BB962C8B-B14F-4D97-AF65-F5344CB8AC3E}">
-        <p14:creationId xmlns:p14="http://schemas.microsoft.com/office/powerpoint/2010/main" val="3674070726"/>
+        <p14:creationId xmlns:p14="http://schemas.microsoft.com/office/powerpoint/2010/main" val="1976769365"/>
       </p:ext>
     </p:extLst>
   </p:cSld>
@@ -4195,895 +4199,6 @@
         <p:spPr>
           <a:xfrm>
             <a:off x="404519" y="426815"/>
-            <a:ext cx="8080962" cy="369332"/>
-          </a:xfrm>
-          <a:prstGeom prst="rect">
-            <a:avLst/>
-          </a:prstGeom>
-          <a:noFill/>
-        </p:spPr>
-        <p:txBody>
-          <a:bodyPr wrap="square" rtlCol="0">
-            <a:spAutoFit/>
-          </a:bodyPr>
-          <a:lstStyle/>
-          <a:p>
-            <a:r>
-              <a:rPr lang="en-US" dirty="0" smtClean="0">
-                <a:solidFill>
-                  <a:schemeClr val="tx2">
-                    <a:lumMod val="50000"/>
-                  </a:schemeClr>
-                </a:solidFill>
-                <a:latin typeface="Avenir Roman"/>
-                <a:cs typeface="Avenir Roman"/>
-              </a:rPr>
-              <a:t>A CNN simulates the brain by “firing” a neuron if it reaches a threshold.</a:t>
-            </a:r>
-          </a:p>
-        </p:txBody>
-      </p:sp>
-      <p:pic>
-        <p:nvPicPr>
-          <p:cNvPr id="3" name="Picture 2" descr="Screen Shot 2017-04-04 at 10.08.40 AM.png"/>
-          <p:cNvPicPr>
-            <a:picLocks noChangeAspect="1"/>
-          </p:cNvPicPr>
-          <p:nvPr/>
-        </p:nvPicPr>
-        <p:blipFill rotWithShape="1">
-          <a:blip r:embed="rId2">
-            <a:extLst>
-              <a:ext uri="{28A0092B-C50C-407E-A947-70E740481C1C}">
-                <a14:useLocalDpi xmlns:a14="http://schemas.microsoft.com/office/drawing/2010/main" val="0"/>
-              </a:ext>
-            </a:extLst>
-          </a:blip>
-          <a:srcRect l="74206" r="2818" b="65376"/>
-          <a:stretch/>
-        </p:blipFill>
-        <p:spPr>
-          <a:xfrm>
-            <a:off x="1392297" y="1994370"/>
-            <a:ext cx="2916296" cy="3922367"/>
-          </a:xfrm>
-          <a:prstGeom prst="rect">
-            <a:avLst/>
-          </a:prstGeom>
-        </p:spPr>
-      </p:pic>
-      <p:sp>
-        <p:nvSpPr>
-          <p:cNvPr id="4" name="TextBox 3"/>
-          <p:cNvSpPr txBox="1"/>
-          <p:nvPr/>
-        </p:nvSpPr>
-        <p:spPr>
-          <a:xfrm>
-            <a:off x="950148" y="1266042"/>
-            <a:ext cx="3605153" cy="338554"/>
-          </a:xfrm>
-          <a:prstGeom prst="rect">
-            <a:avLst/>
-          </a:prstGeom>
-          <a:noFill/>
-        </p:spPr>
-        <p:txBody>
-          <a:bodyPr wrap="square" rtlCol="0">
-            <a:spAutoFit/>
-          </a:bodyPr>
-          <a:lstStyle/>
-          <a:p>
-            <a:r>
-              <a:rPr lang="en-US" sz="1600" dirty="0" smtClean="0">
-                <a:solidFill>
-                  <a:srgbClr val="632523"/>
-                </a:solidFill>
-                <a:latin typeface="Avenir Roman"/>
-                <a:cs typeface="Avenir Roman"/>
-              </a:rPr>
-              <a:t>Apply activation function to output</a:t>
-            </a:r>
-          </a:p>
-        </p:txBody>
-      </p:sp>
-      <p:pic>
-        <p:nvPicPr>
-          <p:cNvPr id="5" name="Picture 4" descr="Screen Shot 2017-04-04 at 10.15.00 AM.png"/>
-          <p:cNvPicPr>
-            <a:picLocks noChangeAspect="1"/>
-          </p:cNvPicPr>
-          <p:nvPr/>
-        </p:nvPicPr>
-        <p:blipFill>
-          <a:blip r:embed="rId3">
-            <a:extLst>
-              <a:ext uri="{28A0092B-C50C-407E-A947-70E740481C1C}">
-                <a14:useLocalDpi xmlns:a14="http://schemas.microsoft.com/office/drawing/2010/main" val="0"/>
-              </a:ext>
-            </a:extLst>
-          </a:blip>
-          <a:stretch>
-            <a:fillRect/>
-          </a:stretch>
-        </p:blipFill>
-        <p:spPr>
-          <a:xfrm>
-            <a:off x="4714321" y="1153153"/>
-            <a:ext cx="2330618" cy="595797"/>
-          </a:xfrm>
-          <a:prstGeom prst="rect">
-            <a:avLst/>
-          </a:prstGeom>
-        </p:spPr>
-      </p:pic>
-      <p:sp>
-        <p:nvSpPr>
-          <p:cNvPr id="6" name="TextBox 5"/>
-          <p:cNvSpPr txBox="1"/>
-          <p:nvPr/>
-        </p:nvSpPr>
-        <p:spPr>
-          <a:xfrm>
-            <a:off x="3885260" y="3215258"/>
-            <a:ext cx="4367154" cy="1323439"/>
-          </a:xfrm>
-          <a:prstGeom prst="rect">
-            <a:avLst/>
-          </a:prstGeom>
-          <a:noFill/>
-        </p:spPr>
-        <p:txBody>
-          <a:bodyPr wrap="square" rtlCol="0">
-            <a:spAutoFit/>
-          </a:bodyPr>
-          <a:lstStyle/>
-          <a:p>
-            <a:r>
-              <a:rPr lang="en-US" sz="1600" dirty="0" smtClean="0">
-                <a:solidFill>
-                  <a:srgbClr val="632523"/>
-                </a:solidFill>
-                <a:latin typeface="Avenir Roman"/>
-                <a:cs typeface="Avenir Roman"/>
-              </a:rPr>
-              <a:t>Has biological intuition, but also mathematical intuition: </a:t>
-            </a:r>
-          </a:p>
-          <a:p>
-            <a:endParaRPr lang="en-US" sz="1600" dirty="0">
-              <a:solidFill>
-                <a:srgbClr val="632523"/>
-              </a:solidFill>
-              <a:latin typeface="Avenir Roman"/>
-              <a:cs typeface="Avenir Roman"/>
-            </a:endParaRPr>
-          </a:p>
-          <a:p>
-            <a:r>
-              <a:rPr lang="en-US" sz="1600" dirty="0" smtClean="0">
-                <a:solidFill>
-                  <a:srgbClr val="632523"/>
-                </a:solidFill>
-                <a:latin typeface="Avenir Roman"/>
-                <a:cs typeface="Avenir Roman"/>
-              </a:rPr>
-              <a:t>adding a nonlinearity transforms output to a plane that may have easily separable classes.</a:t>
-            </a:r>
-          </a:p>
-        </p:txBody>
-      </p:sp>
-    </p:spTree>
-    <p:extLst>
-      <p:ext uri="{BB962C8B-B14F-4D97-AF65-F5344CB8AC3E}">
-        <p14:creationId xmlns:p14="http://schemas.microsoft.com/office/powerpoint/2010/main" val="3561629833"/>
-      </p:ext>
-    </p:extLst>
-  </p:cSld>
-  <p:clrMapOvr>
-    <a:masterClrMapping/>
-  </p:clrMapOvr>
-</p:sld>
-</file>
-
-<file path=ppt/slides/slide6.xml><?xml version="1.0" encoding="utf-8"?>
-<p:sld xmlns:a="http://schemas.openxmlformats.org/drawingml/2006/main" xmlns:r="http://schemas.openxmlformats.org/officeDocument/2006/relationships" xmlns:p="http://schemas.openxmlformats.org/presentationml/2006/main">
-  <p:cSld>
-    <p:spTree>
-      <p:nvGrpSpPr>
-        <p:cNvPr id="1" name=""/>
-        <p:cNvGrpSpPr/>
-        <p:nvPr/>
-      </p:nvGrpSpPr>
-      <p:grpSpPr>
-        <a:xfrm>
-          <a:off x="0" y="0"/>
-          <a:ext cx="0" cy="0"/>
-          <a:chOff x="0" y="0"/>
-          <a:chExt cx="0" cy="0"/>
-        </a:xfrm>
-      </p:grpSpPr>
-      <p:sp>
-        <p:nvSpPr>
-          <p:cNvPr id="2" name="TextBox 1"/>
-          <p:cNvSpPr txBox="1"/>
-          <p:nvPr/>
-        </p:nvSpPr>
-        <p:spPr>
-          <a:xfrm>
-            <a:off x="404519" y="426815"/>
-            <a:ext cx="8080962" cy="646331"/>
-          </a:xfrm>
-          <a:prstGeom prst="rect">
-            <a:avLst/>
-          </a:prstGeom>
-          <a:noFill/>
-        </p:spPr>
-        <p:txBody>
-          <a:bodyPr wrap="square" rtlCol="0">
-            <a:spAutoFit/>
-          </a:bodyPr>
-          <a:lstStyle/>
-          <a:p>
-            <a:r>
-              <a:rPr lang="en-US" dirty="0" smtClean="0">
-                <a:solidFill>
-                  <a:schemeClr val="tx2">
-                    <a:lumMod val="50000"/>
-                  </a:schemeClr>
-                </a:solidFill>
-                <a:latin typeface="Avenir Roman"/>
-                <a:cs typeface="Avenir Roman"/>
-              </a:rPr>
-              <a:t>Subsequent filters can be passed until the CNN reaches it output layer, where the classification prediction against the actual labeled image.</a:t>
-            </a:r>
-          </a:p>
-        </p:txBody>
-      </p:sp>
-      <p:pic>
-        <p:nvPicPr>
-          <p:cNvPr id="7" name="Picture 6"/>
-          <p:cNvPicPr>
-            <a:picLocks noChangeAspect="1"/>
-          </p:cNvPicPr>
-          <p:nvPr/>
-        </p:nvPicPr>
-        <p:blipFill>
-          <a:blip r:embed="rId2"/>
-          <a:stretch>
-            <a:fillRect/>
-          </a:stretch>
-        </p:blipFill>
-        <p:spPr>
-          <a:xfrm>
-            <a:off x="197555" y="1382889"/>
-            <a:ext cx="8632263" cy="4133857"/>
-          </a:xfrm>
-          <a:prstGeom prst="rect">
-            <a:avLst/>
-          </a:prstGeom>
-        </p:spPr>
-      </p:pic>
-      <p:sp>
-        <p:nvSpPr>
-          <p:cNvPr id="8" name="Rectangle 7"/>
-          <p:cNvSpPr/>
-          <p:nvPr/>
-        </p:nvSpPr>
-        <p:spPr>
-          <a:xfrm>
-            <a:off x="4901258" y="6454872"/>
-            <a:ext cx="4120445" cy="307777"/>
-          </a:xfrm>
-          <a:prstGeom prst="rect">
-            <a:avLst/>
-          </a:prstGeom>
-        </p:spPr>
-        <p:txBody>
-          <a:bodyPr wrap="square">
-            <a:spAutoFit/>
-          </a:bodyPr>
-          <a:lstStyle/>
-          <a:p>
-            <a:pPr algn="r"/>
-            <a:r>
-              <a:rPr lang="en-US" sz="1400" dirty="0" smtClean="0">
-                <a:solidFill>
-                  <a:schemeClr val="accent2">
-                    <a:lumMod val="50000"/>
-                  </a:schemeClr>
-                </a:solidFill>
-                <a:latin typeface="Avenir Oblique"/>
-                <a:cs typeface="Avenir Oblique"/>
-              </a:rPr>
-              <a:t>http://cs231n.github.io/convolutional-networks/</a:t>
-            </a:r>
-            <a:endParaRPr lang="en-US" sz="1400" dirty="0">
-              <a:solidFill>
-                <a:schemeClr val="accent2">
-                  <a:lumMod val="50000"/>
-                </a:schemeClr>
-              </a:solidFill>
-              <a:latin typeface="Avenir Oblique"/>
-              <a:cs typeface="Avenir Oblique"/>
-            </a:endParaRPr>
-          </a:p>
-        </p:txBody>
-      </p:sp>
-      <p:sp>
-        <p:nvSpPr>
-          <p:cNvPr id="9" name="TextBox 8"/>
-          <p:cNvSpPr txBox="1"/>
-          <p:nvPr/>
-        </p:nvSpPr>
-        <p:spPr>
-          <a:xfrm>
-            <a:off x="931334" y="5615090"/>
-            <a:ext cx="6594592" cy="584776"/>
-          </a:xfrm>
-          <a:prstGeom prst="rect">
-            <a:avLst/>
-          </a:prstGeom>
-          <a:noFill/>
-        </p:spPr>
-        <p:txBody>
-          <a:bodyPr wrap="square" rtlCol="0">
-            <a:spAutoFit/>
-          </a:bodyPr>
-          <a:lstStyle/>
-          <a:p>
-            <a:r>
-              <a:rPr lang="en-US" sz="1600" dirty="0" smtClean="0">
-                <a:solidFill>
-                  <a:srgbClr val="632523"/>
-                </a:solidFill>
-                <a:latin typeface="Avenir Roman"/>
-                <a:cs typeface="Avenir Roman"/>
-              </a:rPr>
-              <a:t>During training, the filters are fitted. A predictive model requires many images, which requires </a:t>
-            </a:r>
-            <a:r>
-              <a:rPr lang="en-US" sz="1600" dirty="0" smtClean="0">
-                <a:solidFill>
-                  <a:srgbClr val="632523"/>
-                </a:solidFill>
-                <a:latin typeface="Avenir Black"/>
-                <a:cs typeface="Avenir Black"/>
-              </a:rPr>
-              <a:t>a lot of </a:t>
-            </a:r>
-            <a:r>
-              <a:rPr lang="en-US" sz="1600" dirty="0" smtClean="0">
-                <a:solidFill>
-                  <a:srgbClr val="632523"/>
-                </a:solidFill>
-                <a:latin typeface="Avenir Roman"/>
-                <a:cs typeface="Avenir Roman"/>
-              </a:rPr>
-              <a:t>computation.</a:t>
-            </a:r>
-          </a:p>
-        </p:txBody>
-      </p:sp>
-    </p:spTree>
-    <p:extLst>
-      <p:ext uri="{BB962C8B-B14F-4D97-AF65-F5344CB8AC3E}">
-        <p14:creationId xmlns:p14="http://schemas.microsoft.com/office/powerpoint/2010/main" val="1574461561"/>
-      </p:ext>
-    </p:extLst>
-  </p:cSld>
-  <p:clrMapOvr>
-    <a:masterClrMapping/>
-  </p:clrMapOvr>
-</p:sld>
-</file>
-
-<file path=ppt/slides/slide7.xml><?xml version="1.0" encoding="utf-8"?>
-<p:sld xmlns:a="http://schemas.openxmlformats.org/drawingml/2006/main" xmlns:r="http://schemas.openxmlformats.org/officeDocument/2006/relationships" xmlns:p="http://schemas.openxmlformats.org/presentationml/2006/main">
-  <p:cSld>
-    <p:spTree>
-      <p:nvGrpSpPr>
-        <p:cNvPr id="1" name=""/>
-        <p:cNvGrpSpPr/>
-        <p:nvPr/>
-      </p:nvGrpSpPr>
-      <p:grpSpPr>
-        <a:xfrm>
-          <a:off x="0" y="0"/>
-          <a:ext cx="0" cy="0"/>
-          <a:chOff x="0" y="0"/>
-          <a:chExt cx="0" cy="0"/>
-        </a:xfrm>
-      </p:grpSpPr>
-      <p:sp>
-        <p:nvSpPr>
-          <p:cNvPr id="2" name="TextBox 1"/>
-          <p:cNvSpPr txBox="1"/>
-          <p:nvPr/>
-        </p:nvSpPr>
-        <p:spPr>
-          <a:xfrm>
-            <a:off x="404519" y="426815"/>
-            <a:ext cx="6848592" cy="646331"/>
-          </a:xfrm>
-          <a:prstGeom prst="rect">
-            <a:avLst/>
-          </a:prstGeom>
-          <a:noFill/>
-        </p:spPr>
-        <p:txBody>
-          <a:bodyPr wrap="square" rtlCol="0">
-            <a:spAutoFit/>
-          </a:bodyPr>
-          <a:lstStyle/>
-          <a:p>
-            <a:r>
-              <a:rPr lang="en-US" dirty="0" smtClean="0">
-                <a:solidFill>
-                  <a:schemeClr val="tx2">
-                    <a:lumMod val="50000"/>
-                  </a:schemeClr>
-                </a:solidFill>
-                <a:latin typeface="Avenir Roman"/>
-                <a:cs typeface="Avenir Roman"/>
-              </a:rPr>
-              <a:t>Different companies, research institutions use different architectures of CNNs – no theorem exists to say which is best!</a:t>
-            </a:r>
-          </a:p>
-        </p:txBody>
-      </p:sp>
-      <p:pic>
-        <p:nvPicPr>
-          <p:cNvPr id="4" name="Picture 3"/>
-          <p:cNvPicPr>
-            <a:picLocks noChangeAspect="1"/>
-          </p:cNvPicPr>
-          <p:nvPr/>
-        </p:nvPicPr>
-        <p:blipFill>
-          <a:blip r:embed="rId2"/>
-          <a:stretch>
-            <a:fillRect/>
-          </a:stretch>
-        </p:blipFill>
-        <p:spPr>
-          <a:xfrm>
-            <a:off x="1251185" y="4847496"/>
-            <a:ext cx="7685852" cy="1828986"/>
-          </a:xfrm>
-          <a:prstGeom prst="rect">
-            <a:avLst/>
-          </a:prstGeom>
-        </p:spPr>
-      </p:pic>
-      <p:sp>
-        <p:nvSpPr>
-          <p:cNvPr id="5" name="TextBox 4"/>
-          <p:cNvSpPr txBox="1"/>
-          <p:nvPr/>
-        </p:nvSpPr>
-        <p:spPr>
-          <a:xfrm>
-            <a:off x="178741" y="4165712"/>
-            <a:ext cx="3605153" cy="338554"/>
-          </a:xfrm>
-          <a:prstGeom prst="rect">
-            <a:avLst/>
-          </a:prstGeom>
-          <a:noFill/>
-        </p:spPr>
-        <p:txBody>
-          <a:bodyPr wrap="square" rtlCol="0">
-            <a:spAutoFit/>
-          </a:bodyPr>
-          <a:lstStyle/>
-          <a:p>
-            <a:r>
-              <a:rPr lang="en-US" sz="1600" dirty="0" err="1" smtClean="0">
-                <a:solidFill>
-                  <a:srgbClr val="632523"/>
-                </a:solidFill>
-                <a:latin typeface="Avenir Roman"/>
-                <a:cs typeface="Avenir Roman"/>
-              </a:rPr>
-              <a:t>LeNet</a:t>
-            </a:r>
-            <a:endParaRPr lang="en-US" sz="1600" dirty="0" smtClean="0">
-              <a:solidFill>
-                <a:srgbClr val="632523"/>
-              </a:solidFill>
-              <a:latin typeface="Avenir Roman"/>
-              <a:cs typeface="Avenir Roman"/>
-            </a:endParaRPr>
-          </a:p>
-        </p:txBody>
-      </p:sp>
-      <p:pic>
-        <p:nvPicPr>
-          <p:cNvPr id="3" name="Picture 2"/>
-          <p:cNvPicPr>
-            <a:picLocks noChangeAspect="1"/>
-          </p:cNvPicPr>
-          <p:nvPr/>
-        </p:nvPicPr>
-        <p:blipFill>
-          <a:blip r:embed="rId3"/>
-          <a:stretch>
-            <a:fillRect/>
-          </a:stretch>
-        </p:blipFill>
-        <p:spPr>
-          <a:xfrm>
-            <a:off x="1439333" y="1602281"/>
-            <a:ext cx="6829778" cy="2563431"/>
-          </a:xfrm>
-          <a:prstGeom prst="rect">
-            <a:avLst/>
-          </a:prstGeom>
-        </p:spPr>
-      </p:pic>
-      <p:sp>
-        <p:nvSpPr>
-          <p:cNvPr id="9" name="TextBox 8"/>
-          <p:cNvSpPr txBox="1"/>
-          <p:nvPr/>
-        </p:nvSpPr>
-        <p:spPr>
-          <a:xfrm>
-            <a:off x="216370" y="1263727"/>
-            <a:ext cx="3605153" cy="338554"/>
-          </a:xfrm>
-          <a:prstGeom prst="rect">
-            <a:avLst/>
-          </a:prstGeom>
-          <a:noFill/>
-        </p:spPr>
-        <p:txBody>
-          <a:bodyPr wrap="square" rtlCol="0">
-            <a:spAutoFit/>
-          </a:bodyPr>
-          <a:lstStyle/>
-          <a:p>
-            <a:r>
-              <a:rPr lang="en-US" sz="1600" dirty="0" err="1" smtClean="0">
-                <a:solidFill>
-                  <a:srgbClr val="632523"/>
-                </a:solidFill>
-                <a:latin typeface="Avenir Roman"/>
-                <a:cs typeface="Avenir Roman"/>
-              </a:rPr>
-              <a:t>AlexNet</a:t>
-            </a:r>
-            <a:endParaRPr lang="en-US" sz="1600" dirty="0" smtClean="0">
-              <a:solidFill>
-                <a:srgbClr val="632523"/>
-              </a:solidFill>
-              <a:latin typeface="Avenir Roman"/>
-              <a:cs typeface="Avenir Roman"/>
-            </a:endParaRPr>
-          </a:p>
-        </p:txBody>
-      </p:sp>
-    </p:spTree>
-    <p:extLst>
-      <p:ext uri="{BB962C8B-B14F-4D97-AF65-F5344CB8AC3E}">
-        <p14:creationId xmlns:p14="http://schemas.microsoft.com/office/powerpoint/2010/main" val="195646940"/>
-      </p:ext>
-    </p:extLst>
-  </p:cSld>
-  <p:clrMapOvr>
-    <a:masterClrMapping/>
-  </p:clrMapOvr>
-</p:sld>
-</file>
-
-<file path=ppt/slides/slide8.xml><?xml version="1.0" encoding="utf-8"?>
-<p:sld xmlns:a="http://schemas.openxmlformats.org/drawingml/2006/main" xmlns:r="http://schemas.openxmlformats.org/officeDocument/2006/relationships" xmlns:p="http://schemas.openxmlformats.org/presentationml/2006/main">
-  <p:cSld>
-    <p:spTree>
-      <p:nvGrpSpPr>
-        <p:cNvPr id="1" name=""/>
-        <p:cNvGrpSpPr/>
-        <p:nvPr/>
-      </p:nvGrpSpPr>
-      <p:grpSpPr>
-        <a:xfrm>
-          <a:off x="0" y="0"/>
-          <a:ext cx="0" cy="0"/>
-          <a:chOff x="0" y="0"/>
-          <a:chExt cx="0" cy="0"/>
-        </a:xfrm>
-      </p:grpSpPr>
-      <p:pic>
-        <p:nvPicPr>
-          <p:cNvPr id="4" name="Picture 3" descr="Screen Shot 2017-04-04 at 10.58.25 AM.png"/>
-          <p:cNvPicPr>
-            <a:picLocks noChangeAspect="1"/>
-          </p:cNvPicPr>
-          <p:nvPr/>
-        </p:nvPicPr>
-        <p:blipFill>
-          <a:blip r:embed="rId2">
-            <a:extLst>
-              <a:ext uri="{28A0092B-C50C-407E-A947-70E740481C1C}">
-                <a14:useLocalDpi xmlns:a14="http://schemas.microsoft.com/office/drawing/2010/main" val="0"/>
-              </a:ext>
-            </a:extLst>
-          </a:blip>
-          <a:stretch>
-            <a:fillRect/>
-          </a:stretch>
-        </p:blipFill>
-        <p:spPr>
-          <a:xfrm>
-            <a:off x="762000" y="984967"/>
-            <a:ext cx="7591778" cy="3335340"/>
-          </a:xfrm>
-          <a:prstGeom prst="rect">
-            <a:avLst/>
-          </a:prstGeom>
-        </p:spPr>
-      </p:pic>
-      <p:sp>
-        <p:nvSpPr>
-          <p:cNvPr id="2" name="TextBox 1"/>
-          <p:cNvSpPr txBox="1"/>
-          <p:nvPr/>
-        </p:nvSpPr>
-        <p:spPr>
-          <a:xfrm>
-            <a:off x="404520" y="426815"/>
-            <a:ext cx="5032962" cy="646331"/>
-          </a:xfrm>
-          <a:prstGeom prst="rect">
-            <a:avLst/>
-          </a:prstGeom>
-          <a:noFill/>
-        </p:spPr>
-        <p:txBody>
-          <a:bodyPr wrap="square" rtlCol="0">
-            <a:spAutoFit/>
-          </a:bodyPr>
-          <a:lstStyle/>
-          <a:p>
-            <a:r>
-              <a:rPr lang="en-US" dirty="0" smtClean="0">
-                <a:solidFill>
-                  <a:schemeClr val="tx2">
-                    <a:lumMod val="50000"/>
-                  </a:schemeClr>
-                </a:solidFill>
-                <a:latin typeface="Avenir Black"/>
-                <a:cs typeface="Avenir Black"/>
-              </a:rPr>
-              <a:t>Our project</a:t>
-            </a:r>
-            <a:r>
-              <a:rPr lang="en-US" dirty="0" smtClean="0">
-                <a:solidFill>
-                  <a:schemeClr val="tx2">
-                    <a:lumMod val="50000"/>
-                  </a:schemeClr>
-                </a:solidFill>
-                <a:latin typeface="Avenir Roman"/>
-                <a:cs typeface="Avenir Roman"/>
-              </a:rPr>
-              <a:t>: Build a distributed CNN framework on Odyssey using </a:t>
-            </a:r>
-            <a:r>
-              <a:rPr lang="en-US" dirty="0" err="1" smtClean="0">
-                <a:solidFill>
-                  <a:schemeClr val="tx2">
-                    <a:lumMod val="50000"/>
-                  </a:schemeClr>
-                </a:solidFill>
-                <a:latin typeface="Avenir Roman"/>
-                <a:cs typeface="Avenir Roman"/>
-              </a:rPr>
-              <a:t>TensorFlow</a:t>
-            </a:r>
-            <a:r>
-              <a:rPr lang="en-US" dirty="0" smtClean="0">
-                <a:solidFill>
-                  <a:schemeClr val="tx2">
-                    <a:lumMod val="50000"/>
-                  </a:schemeClr>
-                </a:solidFill>
-                <a:latin typeface="Avenir Roman"/>
-                <a:cs typeface="Avenir Roman"/>
-              </a:rPr>
-              <a:t>. </a:t>
-            </a:r>
-          </a:p>
-        </p:txBody>
-      </p:sp>
-      <p:sp>
-        <p:nvSpPr>
-          <p:cNvPr id="5" name="Rectangle 4"/>
-          <p:cNvSpPr/>
-          <p:nvPr/>
-        </p:nvSpPr>
-        <p:spPr>
-          <a:xfrm>
-            <a:off x="4901258" y="6454872"/>
-            <a:ext cx="4120445" cy="307777"/>
-          </a:xfrm>
-          <a:prstGeom prst="rect">
-            <a:avLst/>
-          </a:prstGeom>
-        </p:spPr>
-        <p:txBody>
-          <a:bodyPr wrap="square">
-            <a:spAutoFit/>
-          </a:bodyPr>
-          <a:lstStyle/>
-          <a:p>
-            <a:pPr algn="r"/>
-            <a:r>
-              <a:rPr lang="en-US" sz="1400" dirty="0" err="1" smtClean="0">
-                <a:solidFill>
-                  <a:schemeClr val="accent2">
-                    <a:lumMod val="50000"/>
-                  </a:schemeClr>
-                </a:solidFill>
-                <a:latin typeface="Avenir Oblique"/>
-                <a:cs typeface="Avenir Oblique"/>
-              </a:rPr>
-              <a:t>tensorflow.org</a:t>
-            </a:r>
-            <a:endParaRPr lang="en-US" sz="1400" dirty="0">
-              <a:solidFill>
-                <a:schemeClr val="accent2">
-                  <a:lumMod val="50000"/>
-                </a:schemeClr>
-              </a:solidFill>
-              <a:latin typeface="Avenir Oblique"/>
-              <a:cs typeface="Avenir Oblique"/>
-            </a:endParaRPr>
-          </a:p>
-        </p:txBody>
-      </p:sp>
-      <p:pic>
-        <p:nvPicPr>
-          <p:cNvPr id="6" name="Picture 5" descr="Screen Shot 2017-04-04 at 10.59.44 AM.png"/>
-          <p:cNvPicPr>
-            <a:picLocks noChangeAspect="1"/>
-          </p:cNvPicPr>
-          <p:nvPr/>
-        </p:nvPicPr>
-        <p:blipFill>
-          <a:blip r:embed="rId3">
-            <a:extLst>
-              <a:ext uri="{28A0092B-C50C-407E-A947-70E740481C1C}">
-                <a14:useLocalDpi xmlns:a14="http://schemas.microsoft.com/office/drawing/2010/main" val="0"/>
-              </a:ext>
-            </a:extLst>
-          </a:blip>
-          <a:stretch>
-            <a:fillRect/>
-          </a:stretch>
-        </p:blipFill>
-        <p:spPr>
-          <a:xfrm>
-            <a:off x="1075501" y="1073146"/>
-            <a:ext cx="921583" cy="1188156"/>
-          </a:xfrm>
-          <a:prstGeom prst="rect">
-            <a:avLst/>
-          </a:prstGeom>
-        </p:spPr>
-      </p:pic>
-      <p:sp>
-        <p:nvSpPr>
-          <p:cNvPr id="7" name="TextBox 6"/>
-          <p:cNvSpPr txBox="1"/>
-          <p:nvPr/>
-        </p:nvSpPr>
-        <p:spPr>
-          <a:xfrm>
-            <a:off x="1796815" y="1510634"/>
-            <a:ext cx="2079037" cy="338554"/>
-          </a:xfrm>
-          <a:prstGeom prst="rect">
-            <a:avLst/>
-          </a:prstGeom>
-          <a:noFill/>
-        </p:spPr>
-        <p:txBody>
-          <a:bodyPr wrap="square" rtlCol="0">
-            <a:spAutoFit/>
-          </a:bodyPr>
-          <a:lstStyle/>
-          <a:p>
-            <a:r>
-              <a:rPr lang="en-US" sz="1600" dirty="0" smtClean="0">
-                <a:solidFill>
-                  <a:srgbClr val="632523"/>
-                </a:solidFill>
-                <a:latin typeface="Avenir Roman"/>
-                <a:cs typeface="Avenir Roman"/>
-              </a:rPr>
-              <a:t>user specified graph</a:t>
-            </a:r>
-          </a:p>
-        </p:txBody>
-      </p:sp>
-      <p:pic>
-        <p:nvPicPr>
-          <p:cNvPr id="8" name="Picture 7" descr="Screen Shot 2017-04-04 at 11.00.40 AM.png"/>
-          <p:cNvPicPr>
-            <a:picLocks noChangeAspect="1"/>
-          </p:cNvPicPr>
-          <p:nvPr/>
-        </p:nvPicPr>
-        <p:blipFill>
-          <a:blip r:embed="rId4">
-            <a:extLst>
-              <a:ext uri="{28A0092B-C50C-407E-A947-70E740481C1C}">
-                <a14:useLocalDpi xmlns:a14="http://schemas.microsoft.com/office/drawing/2010/main" val="0"/>
-              </a:ext>
-            </a:extLst>
-          </a:blip>
-          <a:stretch>
-            <a:fillRect/>
-          </a:stretch>
-        </p:blipFill>
-        <p:spPr>
-          <a:xfrm>
-            <a:off x="295661" y="3818131"/>
-            <a:ext cx="4426856" cy="2869259"/>
-          </a:xfrm>
-          <a:prstGeom prst="rect">
-            <a:avLst/>
-          </a:prstGeom>
-          <a:ln>
-            <a:solidFill>
-              <a:schemeClr val="bg1">
-                <a:lumMod val="50000"/>
-              </a:schemeClr>
-            </a:solidFill>
-          </a:ln>
-        </p:spPr>
-      </p:pic>
-    </p:spTree>
-    <p:extLst>
-      <p:ext uri="{BB962C8B-B14F-4D97-AF65-F5344CB8AC3E}">
-        <p14:creationId xmlns:p14="http://schemas.microsoft.com/office/powerpoint/2010/main" val="94076078"/>
-      </p:ext>
-    </p:extLst>
-  </p:cSld>
-  <p:clrMapOvr>
-    <a:masterClrMapping/>
-  </p:clrMapOvr>
-</p:sld>
-</file>
-
-<file path=ppt/slides/slide9.xml><?xml version="1.0" encoding="utf-8"?>
-<p:sld xmlns:a="http://schemas.openxmlformats.org/drawingml/2006/main" xmlns:r="http://schemas.openxmlformats.org/officeDocument/2006/relationships" xmlns:p="http://schemas.openxmlformats.org/presentationml/2006/main">
-  <p:cSld>
-    <p:spTree>
-      <p:nvGrpSpPr>
-        <p:cNvPr id="1" name=""/>
-        <p:cNvGrpSpPr/>
-        <p:nvPr/>
-      </p:nvGrpSpPr>
-      <p:grpSpPr>
-        <a:xfrm>
-          <a:off x="0" y="0"/>
-          <a:ext cx="0" cy="0"/>
-          <a:chOff x="0" y="0"/>
-          <a:chExt cx="0" cy="0"/>
-        </a:xfrm>
-      </p:grpSpPr>
-      <p:sp>
-        <p:nvSpPr>
-          <p:cNvPr id="2" name="TextBox 1"/>
-          <p:cNvSpPr txBox="1"/>
-          <p:nvPr/>
-        </p:nvSpPr>
-        <p:spPr>
-          <a:xfrm>
-            <a:off x="404519" y="426815"/>
             <a:ext cx="6848592" cy="369332"/>
           </a:xfrm>
           <a:prstGeom prst="rect">
@@ -5107,8 +4222,29 @@
                 <a:latin typeface="Avenir Roman"/>
                 <a:cs typeface="Avenir Roman"/>
               </a:rPr>
-              <a:t>Project Objectives</a:t>
-            </a:r>
+              <a:t>Project </a:t>
+            </a:r>
+            <a:r>
+              <a:rPr lang="en-US" dirty="0" smtClean="0">
+                <a:solidFill>
+                  <a:schemeClr val="tx2">
+                    <a:lumMod val="50000"/>
+                  </a:schemeClr>
+                </a:solidFill>
+                <a:latin typeface="Avenir Roman"/>
+                <a:cs typeface="Avenir Roman"/>
+              </a:rPr>
+              <a:t>Updates</a:t>
+            </a:r>
+            <a:endParaRPr lang="en-US" dirty="0" smtClean="0">
+              <a:solidFill>
+                <a:schemeClr val="tx2">
+                  <a:lumMod val="50000"/>
+                </a:schemeClr>
+              </a:solidFill>
+              <a:latin typeface="Avenir Roman"/>
+              <a:cs typeface="Avenir Roman"/>
+            </a:endParaRPr>
           </a:p>
         </p:txBody>
       </p:sp>
@@ -5120,8 +4256,8 @@
         </p:nvSpPr>
         <p:spPr>
           <a:xfrm>
-            <a:off x="980252" y="1519955"/>
-            <a:ext cx="7693378" cy="4524316"/>
+            <a:off x="980252" y="1773955"/>
+            <a:ext cx="7693378" cy="2308324"/>
           </a:xfrm>
           <a:prstGeom prst="rect">
             <a:avLst/>
@@ -5144,7 +4280,7 @@
                 <a:latin typeface="Avenir Roman"/>
                 <a:cs typeface="Avenir Roman"/>
               </a:rPr>
-              <a:t>Get single-core </a:t>
+              <a:t>Update </a:t>
             </a:r>
             <a:r>
               <a:rPr lang="en-US" dirty="0" err="1" smtClean="0">
@@ -5156,7 +4292,7 @@
                 <a:latin typeface="Avenir Roman"/>
                 <a:cs typeface="Avenir Roman"/>
               </a:rPr>
-              <a:t>TensorFlow</a:t>
+              <a:t>pySpark</a:t>
             </a:r>
             <a:r>
               <a:rPr lang="en-US" dirty="0" smtClean="0">
@@ -5168,22 +4304,7 @@
                 <a:latin typeface="Avenir Roman"/>
                 <a:cs typeface="Avenir Roman"/>
               </a:rPr>
-              <a:t> running on Odyssey with MNIST CNN</a:t>
-            </a:r>
-          </a:p>
-          <a:p>
-            <a:r>
-              <a:rPr lang="en-US" dirty="0" smtClean="0">
-                <a:solidFill>
-                  <a:schemeClr val="tx1">
-                    <a:lumMod val="50000"/>
-                    <a:lumOff val="50000"/>
-                  </a:schemeClr>
-                </a:solidFill>
-                <a:latin typeface="Avenir Roman"/>
-                <a:cs typeface="Avenir Roman"/>
-              </a:rPr>
-              <a:t>	Results: 10k images – 3 hours to train</a:t>
+              <a:t> for multi-class classification</a:t>
             </a:r>
           </a:p>
           <a:p>
@@ -5198,6 +4319,68 @@
             </a:endParaRPr>
           </a:p>
           <a:p>
+            <a:r>
+              <a:rPr lang="en-US" dirty="0" smtClean="0">
+                <a:solidFill>
+                  <a:schemeClr val="tx2">
+                    <a:lumMod val="50000"/>
+                  </a:schemeClr>
+                </a:solidFill>
+                <a:latin typeface="Avenir Roman"/>
+                <a:cs typeface="Avenir Roman"/>
+              </a:rPr>
+              <a:t>Implement MPI parallelization</a:t>
+            </a:r>
+          </a:p>
+          <a:p>
+            <a:endParaRPr lang="en-US" dirty="0">
+              <a:solidFill>
+                <a:schemeClr val="tx2">
+                  <a:lumMod val="50000"/>
+                </a:schemeClr>
+              </a:solidFill>
+              <a:latin typeface="Avenir Roman"/>
+              <a:cs typeface="Avenir Roman"/>
+            </a:endParaRPr>
+          </a:p>
+          <a:p>
+            <a:r>
+              <a:rPr lang="en-US" dirty="0" smtClean="0">
+                <a:solidFill>
+                  <a:schemeClr val="tx2">
+                    <a:lumMod val="50000"/>
+                  </a:schemeClr>
+                </a:solidFill>
+                <a:latin typeface="Avenir Roman"/>
+                <a:cs typeface="Avenir Roman"/>
+              </a:rPr>
+              <a:t>Benchmark vs. serial algorithm</a:t>
+            </a:r>
+          </a:p>
+          <a:p>
+            <a:endParaRPr lang="en-US" dirty="0">
+              <a:solidFill>
+                <a:schemeClr val="tx2">
+                  <a:lumMod val="50000"/>
+                </a:schemeClr>
+              </a:solidFill>
+              <a:latin typeface="Avenir Roman"/>
+              <a:cs typeface="Avenir Roman"/>
+            </a:endParaRPr>
+          </a:p>
+          <a:p>
+            <a:r>
+              <a:rPr lang="en-US" dirty="0" smtClean="0">
+                <a:solidFill>
+                  <a:schemeClr val="tx2">
+                    <a:lumMod val="50000"/>
+                  </a:schemeClr>
+                </a:solidFill>
+                <a:latin typeface="Avenir Roman"/>
+                <a:cs typeface="Avenir Roman"/>
+              </a:rPr>
+              <a:t>Explore data vs. model parallelism</a:t>
+            </a:r>
             <a:endParaRPr lang="en-US" dirty="0" smtClean="0">
               <a:solidFill>
                 <a:schemeClr val="tx2">
@@ -5209,17 +4392,6 @@
             </a:endParaRPr>
           </a:p>
           <a:p>
-            <a:endParaRPr lang="en-US" dirty="0" smtClean="0">
-              <a:solidFill>
-                <a:schemeClr val="tx2">
-                  <a:lumMod val="50000"/>
-                </a:schemeClr>
-              </a:solidFill>
-              <a:latin typeface="Avenir Roman"/>
-              <a:cs typeface="Avenir Roman"/>
-            </a:endParaRPr>
-          </a:p>
-          <a:p>
             <a:endParaRPr lang="en-US" dirty="0">
               <a:solidFill>
                 <a:schemeClr val="tx2">
@@ -5230,70 +4402,109 @@
               <a:cs typeface="Avenir Roman"/>
             </a:endParaRPr>
           </a:p>
+        </p:txBody>
+      </p:sp>
+      <p:sp>
+        <p:nvSpPr>
+          <p:cNvPr id="4" name="TextBox 3"/>
+          <p:cNvSpPr txBox="1"/>
+          <p:nvPr/>
+        </p:nvSpPr>
+        <p:spPr>
+          <a:xfrm>
+            <a:off x="679215" y="1150623"/>
+            <a:ext cx="2742314" cy="369332"/>
+          </a:xfrm>
+          <a:prstGeom prst="rect">
+            <a:avLst/>
+          </a:prstGeom>
+          <a:noFill/>
+        </p:spPr>
+        <p:txBody>
+          <a:bodyPr wrap="square" rtlCol="0">
+            <a:spAutoFit/>
+          </a:bodyPr>
+          <a:lstStyle/>
           <a:p>
             <a:r>
               <a:rPr lang="en-US" dirty="0" smtClean="0">
                 <a:solidFill>
-                  <a:schemeClr val="tx2">
-                    <a:lumMod val="50000"/>
-                  </a:schemeClr>
+                  <a:srgbClr val="632523"/>
                 </a:solidFill>
                 <a:latin typeface="Avenir Roman"/>
                 <a:cs typeface="Avenir Roman"/>
               </a:rPr>
-              <a:t>Get multiple-core </a:t>
-            </a:r>
-            <a:r>
-              <a:rPr lang="en-US" dirty="0" err="1" smtClean="0">
-                <a:solidFill>
-                  <a:schemeClr val="tx2">
-                    <a:lumMod val="50000"/>
-                  </a:schemeClr>
-                </a:solidFill>
-                <a:latin typeface="Avenir Roman"/>
-                <a:cs typeface="Avenir Roman"/>
-              </a:rPr>
-              <a:t>TensorFlow</a:t>
-            </a:r>
-            <a:r>
-              <a:rPr lang="en-US" dirty="0" smtClean="0">
-                <a:solidFill>
-                  <a:schemeClr val="tx2">
-                    <a:lumMod val="50000"/>
-                  </a:schemeClr>
-                </a:solidFill>
-                <a:latin typeface="Avenir Roman"/>
-                <a:cs typeface="Avenir Roman"/>
-              </a:rPr>
-              <a:t> running on Odyssey with MNIST CNN</a:t>
-            </a:r>
-          </a:p>
-          <a:p>
+              <a:t>Needs to be done</a:t>
+            </a:r>
             <a:endParaRPr lang="en-US" dirty="0" smtClean="0">
               <a:solidFill>
-                <a:schemeClr val="tx2">
-                  <a:lumMod val="50000"/>
-                </a:schemeClr>
+                <a:srgbClr val="632523"/>
               </a:solidFill>
               <a:latin typeface="Avenir Roman"/>
               <a:cs typeface="Avenir Roman"/>
             </a:endParaRPr>
           </a:p>
+        </p:txBody>
+      </p:sp>
+      <p:sp>
+        <p:nvSpPr>
+          <p:cNvPr id="6" name="TextBox 5"/>
+          <p:cNvSpPr txBox="1"/>
+          <p:nvPr/>
+        </p:nvSpPr>
+        <p:spPr>
+          <a:xfrm>
+            <a:off x="679215" y="4452815"/>
+            <a:ext cx="2526830" cy="369332"/>
+          </a:xfrm>
+          <a:prstGeom prst="rect">
+            <a:avLst/>
+          </a:prstGeom>
+          <a:noFill/>
+        </p:spPr>
+        <p:txBody>
+          <a:bodyPr wrap="square" rtlCol="0">
+            <a:spAutoFit/>
+          </a:bodyPr>
+          <a:lstStyle/>
           <a:p>
             <a:r>
               <a:rPr lang="en-US" dirty="0" smtClean="0">
                 <a:solidFill>
-                  <a:schemeClr val="tx2">
-                    <a:lumMod val="50000"/>
-                  </a:schemeClr>
+                  <a:srgbClr val="632523"/>
                 </a:solidFill>
                 <a:latin typeface="Avenir Roman"/>
                 <a:cs typeface="Avenir Roman"/>
               </a:rPr>
-              <a:t>Get GPU-accelerated </a:t>
-            </a:r>
-            <a:r>
-              <a:rPr lang="en-US" dirty="0" err="1" smtClean="0">
+              <a:t>If time permits</a:t>
+            </a:r>
+          </a:p>
+        </p:txBody>
+      </p:sp>
+      <p:sp>
+        <p:nvSpPr>
+          <p:cNvPr id="7" name="TextBox 6"/>
+          <p:cNvSpPr txBox="1"/>
+          <p:nvPr/>
+        </p:nvSpPr>
+        <p:spPr>
+          <a:xfrm>
+            <a:off x="980252" y="5156731"/>
+            <a:ext cx="7693378" cy="646331"/>
+          </a:xfrm>
+          <a:prstGeom prst="rect">
+            <a:avLst/>
+          </a:prstGeom>
+          <a:noFill/>
+        </p:spPr>
+        <p:txBody>
+          <a:bodyPr wrap="square" rtlCol="0">
+            <a:spAutoFit/>
+          </a:bodyPr>
+          <a:lstStyle/>
+          <a:p>
+            <a:r>
+              <a:rPr lang="en-US" dirty="0" smtClean="0">
                 <a:solidFill>
                   <a:schemeClr val="tx2">
                     <a:lumMod val="50000"/>
@@ -5302,22 +4513,8 @@
                 <a:latin typeface="Avenir Roman"/>
                 <a:cs typeface="Avenir Roman"/>
               </a:rPr>
-              <a:t>TensorFlow</a:t>
-            </a:r>
-            <a:r>
-              <a:rPr lang="en-US" dirty="0" smtClean="0">
-                <a:solidFill>
-                  <a:schemeClr val="tx2">
-                    <a:lumMod val="50000"/>
-                  </a:schemeClr>
-                </a:solidFill>
-                <a:latin typeface="Avenir Roman"/>
-                <a:cs typeface="Avenir Roman"/>
-              </a:rPr>
-              <a:t> running on Odyssey with MNIST CNN</a:t>
-            </a:r>
-          </a:p>
-          <a:p>
+              <a:t>Train model on our own set of images – e.g. pictures of stretched fingers (literal digits)</a:t>
+            </a:r>
             <a:endParaRPr lang="en-US" dirty="0">
               <a:solidFill>
                 <a:schemeClr val="tx2">
@@ -5328,189 +4525,12 @@
               <a:cs typeface="Avenir Roman"/>
             </a:endParaRPr>
           </a:p>
-          <a:p>
-            <a:r>
-              <a:rPr lang="en-US" dirty="0" smtClean="0">
-                <a:solidFill>
-                  <a:schemeClr val="tx2">
-                    <a:lumMod val="50000"/>
-                  </a:schemeClr>
-                </a:solidFill>
-                <a:latin typeface="Avenir Roman"/>
-                <a:cs typeface="Avenir Roman"/>
-              </a:rPr>
-              <a:t>Train CNN with custom images</a:t>
-            </a:r>
-          </a:p>
-          <a:p>
-            <a:endParaRPr lang="en-US" dirty="0">
-              <a:solidFill>
-                <a:schemeClr val="tx2">
-                  <a:lumMod val="50000"/>
-                </a:schemeClr>
-              </a:solidFill>
-              <a:latin typeface="Avenir Roman"/>
-              <a:cs typeface="Avenir Roman"/>
-            </a:endParaRPr>
-          </a:p>
-          <a:p>
-            <a:endParaRPr lang="en-US" dirty="0" smtClean="0">
-              <a:solidFill>
-                <a:schemeClr val="tx2">
-                  <a:lumMod val="50000"/>
-                </a:schemeClr>
-              </a:solidFill>
-              <a:latin typeface="Avenir Roman"/>
-              <a:cs typeface="Avenir Roman"/>
-            </a:endParaRPr>
-          </a:p>
-          <a:p>
-            <a:endParaRPr lang="en-US" dirty="0">
-              <a:solidFill>
-                <a:schemeClr val="tx2">
-                  <a:lumMod val="50000"/>
-                </a:schemeClr>
-              </a:solidFill>
-              <a:latin typeface="Avenir Roman"/>
-              <a:cs typeface="Avenir Roman"/>
-            </a:endParaRPr>
-          </a:p>
-          <a:p>
-            <a:r>
-              <a:rPr lang="en-US" dirty="0" smtClean="0">
-                <a:solidFill>
-                  <a:schemeClr val="tx2">
-                    <a:lumMod val="50000"/>
-                  </a:schemeClr>
-                </a:solidFill>
-                <a:latin typeface="Avenir Roman"/>
-                <a:cs typeface="Avenir Roman"/>
-              </a:rPr>
-              <a:t>Test performance of different CNN architectures</a:t>
-            </a:r>
-          </a:p>
-          <a:p>
-            <a:endParaRPr lang="en-US" dirty="0" smtClean="0">
-              <a:solidFill>
-                <a:schemeClr val="tx2">
-                  <a:lumMod val="50000"/>
-                </a:schemeClr>
-              </a:solidFill>
-              <a:latin typeface="Avenir Roman"/>
-              <a:cs typeface="Avenir Roman"/>
-            </a:endParaRPr>
-          </a:p>
-        </p:txBody>
-      </p:sp>
-      <p:sp>
-        <p:nvSpPr>
-          <p:cNvPr id="4" name="TextBox 3"/>
-          <p:cNvSpPr txBox="1"/>
-          <p:nvPr/>
-        </p:nvSpPr>
-        <p:spPr>
-          <a:xfrm>
-            <a:off x="679215" y="1150623"/>
-            <a:ext cx="1136415" cy="369332"/>
-          </a:xfrm>
-          <a:prstGeom prst="rect">
-            <a:avLst/>
-          </a:prstGeom>
-          <a:noFill/>
-        </p:spPr>
-        <p:txBody>
-          <a:bodyPr wrap="square" rtlCol="0">
-            <a:spAutoFit/>
-          </a:bodyPr>
-          <a:lstStyle/>
-          <a:p>
-            <a:r>
-              <a:rPr lang="en-US" dirty="0" smtClean="0">
-                <a:solidFill>
-                  <a:srgbClr val="632523"/>
-                </a:solidFill>
-                <a:latin typeface="Avenir Roman"/>
-                <a:cs typeface="Avenir Roman"/>
-              </a:rPr>
-              <a:t>Done</a:t>
-            </a:r>
-          </a:p>
-        </p:txBody>
-      </p:sp>
-      <p:sp>
-        <p:nvSpPr>
-          <p:cNvPr id="5" name="TextBox 4"/>
-          <p:cNvSpPr txBox="1"/>
-          <p:nvPr/>
-        </p:nvSpPr>
-        <p:spPr>
-          <a:xfrm>
-            <a:off x="679215" y="2794193"/>
-            <a:ext cx="2526830" cy="369332"/>
-          </a:xfrm>
-          <a:prstGeom prst="rect">
-            <a:avLst/>
-          </a:prstGeom>
-          <a:noFill/>
-        </p:spPr>
-        <p:txBody>
-          <a:bodyPr wrap="square" rtlCol="0">
-            <a:spAutoFit/>
-          </a:bodyPr>
-          <a:lstStyle/>
-          <a:p>
-            <a:r>
-              <a:rPr lang="en-US" dirty="0" smtClean="0">
-                <a:solidFill>
-                  <a:srgbClr val="632523"/>
-                </a:solidFill>
-                <a:latin typeface="Avenir Roman"/>
-                <a:cs typeface="Avenir Roman"/>
-              </a:rPr>
-              <a:t>Needs to be done</a:t>
-            </a:r>
-          </a:p>
-        </p:txBody>
-      </p:sp>
-      <p:sp>
-        <p:nvSpPr>
-          <p:cNvPr id="6" name="TextBox 5"/>
-          <p:cNvSpPr txBox="1"/>
-          <p:nvPr/>
-        </p:nvSpPr>
-        <p:spPr>
-          <a:xfrm>
-            <a:off x="679215" y="5006813"/>
-            <a:ext cx="2526830" cy="369332"/>
-          </a:xfrm>
-          <a:prstGeom prst="rect">
-            <a:avLst/>
-          </a:prstGeom>
-          <a:noFill/>
-        </p:spPr>
-        <p:txBody>
-          <a:bodyPr wrap="square" rtlCol="0">
-            <a:spAutoFit/>
-          </a:bodyPr>
-          <a:lstStyle/>
-          <a:p>
-            <a:r>
-              <a:rPr lang="en-US" dirty="0" smtClean="0">
-                <a:solidFill>
-                  <a:srgbClr val="632523"/>
-                </a:solidFill>
-                <a:latin typeface="Avenir Roman"/>
-                <a:cs typeface="Avenir Roman"/>
-              </a:rPr>
-              <a:t>If time permits</a:t>
-            </a:r>
-          </a:p>
         </p:txBody>
       </p:sp>
     </p:spTree>
     <p:extLst>
       <p:ext uri="{BB962C8B-B14F-4D97-AF65-F5344CB8AC3E}">
-        <p14:creationId xmlns:p14="http://schemas.microsoft.com/office/powerpoint/2010/main" val="1976769365"/>
+        <p14:creationId xmlns:p14="http://schemas.microsoft.com/office/powerpoint/2010/main" val="1436136888"/>
       </p:ext>
     </p:extLst>
   </p:cSld>

</xml_diff>

<commit_message>
created multi-class classification - dc
</commit_message>
<xml_diff>
--- a/benchmarks/Update_Rafa_1.pptx
+++ b/benchmarks/Update_Rafa_1.pptx
@@ -292,7 +292,7 @@
           <a:p>
             <a:fld id="{8A1380EC-629E-5848-BEE6-91E483A64CBC}" type="datetimeFigureOut">
               <a:rPr lang="en-US" smtClean="0"/>
-              <a:t>4/5/17</a:t>
+              <a:t>4/6/17</a:t>
             </a:fld>
             <a:endParaRPr lang="en-US"/>
           </a:p>
@@ -462,7 +462,7 @@
           <a:p>
             <a:fld id="{8A1380EC-629E-5848-BEE6-91E483A64CBC}" type="datetimeFigureOut">
               <a:rPr lang="en-US" smtClean="0"/>
-              <a:t>4/5/17</a:t>
+              <a:t>4/6/17</a:t>
             </a:fld>
             <a:endParaRPr lang="en-US"/>
           </a:p>
@@ -642,7 +642,7 @@
           <a:p>
             <a:fld id="{8A1380EC-629E-5848-BEE6-91E483A64CBC}" type="datetimeFigureOut">
               <a:rPr lang="en-US" smtClean="0"/>
-              <a:t>4/5/17</a:t>
+              <a:t>4/6/17</a:t>
             </a:fld>
             <a:endParaRPr lang="en-US"/>
           </a:p>
@@ -812,7 +812,7 @@
           <a:p>
             <a:fld id="{8A1380EC-629E-5848-BEE6-91E483A64CBC}" type="datetimeFigureOut">
               <a:rPr lang="en-US" smtClean="0"/>
-              <a:t>4/5/17</a:t>
+              <a:t>4/6/17</a:t>
             </a:fld>
             <a:endParaRPr lang="en-US"/>
           </a:p>
@@ -1058,7 +1058,7 @@
           <a:p>
             <a:fld id="{8A1380EC-629E-5848-BEE6-91E483A64CBC}" type="datetimeFigureOut">
               <a:rPr lang="en-US" smtClean="0"/>
-              <a:t>4/5/17</a:t>
+              <a:t>4/6/17</a:t>
             </a:fld>
             <a:endParaRPr lang="en-US"/>
           </a:p>
@@ -1346,7 +1346,7 @@
           <a:p>
             <a:fld id="{8A1380EC-629E-5848-BEE6-91E483A64CBC}" type="datetimeFigureOut">
               <a:rPr lang="en-US" smtClean="0"/>
-              <a:t>4/5/17</a:t>
+              <a:t>4/6/17</a:t>
             </a:fld>
             <a:endParaRPr lang="en-US"/>
           </a:p>
@@ -1768,7 +1768,7 @@
           <a:p>
             <a:fld id="{8A1380EC-629E-5848-BEE6-91E483A64CBC}" type="datetimeFigureOut">
               <a:rPr lang="en-US" smtClean="0"/>
-              <a:t>4/5/17</a:t>
+              <a:t>4/6/17</a:t>
             </a:fld>
             <a:endParaRPr lang="en-US"/>
           </a:p>
@@ -1886,7 +1886,7 @@
           <a:p>
             <a:fld id="{8A1380EC-629E-5848-BEE6-91E483A64CBC}" type="datetimeFigureOut">
               <a:rPr lang="en-US" smtClean="0"/>
-              <a:t>4/5/17</a:t>
+              <a:t>4/6/17</a:t>
             </a:fld>
             <a:endParaRPr lang="en-US"/>
           </a:p>
@@ -1981,7 +1981,7 @@
           <a:p>
             <a:fld id="{8A1380EC-629E-5848-BEE6-91E483A64CBC}" type="datetimeFigureOut">
               <a:rPr lang="en-US" smtClean="0"/>
-              <a:t>4/5/17</a:t>
+              <a:t>4/6/17</a:t>
             </a:fld>
             <a:endParaRPr lang="en-US"/>
           </a:p>
@@ -2258,7 +2258,7 @@
           <a:p>
             <a:fld id="{8A1380EC-629E-5848-BEE6-91E483A64CBC}" type="datetimeFigureOut">
               <a:rPr lang="en-US" smtClean="0"/>
-              <a:t>4/5/17</a:t>
+              <a:t>4/6/17</a:t>
             </a:fld>
             <a:endParaRPr lang="en-US"/>
           </a:p>
@@ -2511,7 +2511,7 @@
           <a:p>
             <a:fld id="{8A1380EC-629E-5848-BEE6-91E483A64CBC}" type="datetimeFigureOut">
               <a:rPr lang="en-US" smtClean="0"/>
-              <a:t>4/5/17</a:t>
+              <a:t>4/6/17</a:t>
             </a:fld>
             <a:endParaRPr lang="en-US"/>
           </a:p>
@@ -2724,7 +2724,7 @@
           <a:p>
             <a:fld id="{8A1380EC-629E-5848-BEE6-91E483A64CBC}" type="datetimeFigureOut">
               <a:rPr lang="en-US" smtClean="0"/>
-              <a:t>4/5/17</a:t>
+              <a:t>4/6/17</a:t>
             </a:fld>
             <a:endParaRPr lang="en-US"/>
           </a:p>
@@ -3131,29 +3131,8 @@
                 <a:latin typeface="Avenir Roman"/>
                 <a:cs typeface="Avenir Roman"/>
               </a:rPr>
-              <a:t>Highly Parallelized Image Recognition via </a:t>
-            </a:r>
-            <a:r>
-              <a:rPr lang="en-US" sz="2000" dirty="0" smtClean="0">
-                <a:solidFill>
-                  <a:schemeClr val="tx2">
-                    <a:lumMod val="50000"/>
-                  </a:schemeClr>
-                </a:solidFill>
-                <a:latin typeface="Avenir Roman"/>
-                <a:cs typeface="Avenir Roman"/>
-              </a:rPr>
-              <a:t>Spark + MPI</a:t>
-            </a:r>
-            <a:endParaRPr lang="en-US" sz="2000" dirty="0" smtClean="0">
-              <a:solidFill>
-                <a:schemeClr val="tx2">
-                  <a:lumMod val="50000"/>
-                </a:schemeClr>
-              </a:solidFill>
-              <a:latin typeface="Avenir Roman"/>
-              <a:cs typeface="Avenir Roman"/>
-            </a:endParaRPr>
+              <a:t>Highly Parallelized Image Recognition via Spark + MPI</a:t>
+            </a:r>
           </a:p>
         </p:txBody>
       </p:sp>
@@ -3407,15 +3386,6 @@
               </a:rPr>
               <a:t>Image Recognition is a rapidly developing area of research.</a:t>
             </a:r>
-            <a:endParaRPr lang="en-US" dirty="0" smtClean="0">
-              <a:solidFill>
-                <a:schemeClr val="tx2">
-                  <a:lumMod val="50000"/>
-                </a:schemeClr>
-              </a:solidFill>
-              <a:latin typeface="Avenir Roman"/>
-              <a:cs typeface="Avenir Roman"/>
-            </a:endParaRPr>
           </a:p>
         </p:txBody>
       </p:sp>
@@ -3481,13 +3451,6 @@
               </a:rPr>
               <a:t>based in optimization/machine learning algorithms </a:t>
             </a:r>
-            <a:endParaRPr lang="en-US" sz="1600" dirty="0" smtClean="0">
-              <a:solidFill>
-                <a:srgbClr val="632523"/>
-              </a:solidFill>
-              <a:latin typeface="Avenir Roman"/>
-              <a:cs typeface="Avenir Roman"/>
-            </a:endParaRPr>
           </a:p>
         </p:txBody>
       </p:sp>
@@ -3506,7 +3469,7 @@
         </p:blipFill>
         <p:spPr>
           <a:xfrm>
-            <a:off x="330507" y="2075943"/>
+            <a:off x="330507" y="1717355"/>
             <a:ext cx="8505263" cy="1778879"/>
           </a:xfrm>
           <a:prstGeom prst="rect">
@@ -3522,7 +3485,7 @@
         </p:nvSpPr>
         <p:spPr>
           <a:xfrm>
-            <a:off x="650993" y="5032100"/>
+            <a:off x="650993" y="3841899"/>
             <a:ext cx="7328370" cy="338554"/>
           </a:xfrm>
           <a:prstGeom prst="rect">
@@ -3545,6 +3508,65 @@
                 <a:cs typeface="Avenir Roman"/>
               </a:rPr>
               <a:t>Can be further developed by adding more layers – e.g. a neural network</a:t>
+            </a:r>
+          </a:p>
+        </p:txBody>
+      </p:sp>
+      <p:pic>
+        <p:nvPicPr>
+          <p:cNvPr id="4" name="Picture 3"/>
+          <p:cNvPicPr>
+            <a:picLocks noChangeAspect="1"/>
+          </p:cNvPicPr>
+          <p:nvPr/>
+        </p:nvPicPr>
+        <p:blipFill>
+          <a:blip r:embed="rId3"/>
+          <a:stretch>
+            <a:fillRect/>
+          </a:stretch>
+        </p:blipFill>
+        <p:spPr>
+          <a:xfrm>
+            <a:off x="650993" y="4281445"/>
+            <a:ext cx="7647669" cy="2246503"/>
+          </a:xfrm>
+          <a:prstGeom prst="rect">
+            <a:avLst/>
+          </a:prstGeom>
+        </p:spPr>
+      </p:pic>
+      <p:sp>
+        <p:nvSpPr>
+          <p:cNvPr id="7" name="TextBox 6"/>
+          <p:cNvSpPr txBox="1"/>
+          <p:nvPr/>
+        </p:nvSpPr>
+        <p:spPr>
+          <a:xfrm>
+            <a:off x="7490178" y="6358671"/>
+            <a:ext cx="978370" cy="338554"/>
+          </a:xfrm>
+          <a:prstGeom prst="rect">
+            <a:avLst/>
+          </a:prstGeom>
+          <a:noFill/>
+        </p:spPr>
+        <p:txBody>
+          <a:bodyPr wrap="square" rtlCol="0">
+            <a:spAutoFit/>
+          </a:bodyPr>
+          <a:lstStyle/>
+          <a:p>
+            <a:r>
+              <a:rPr lang="en-US" sz="1600" dirty="0" err="1" smtClean="0">
+                <a:solidFill>
+                  <a:srgbClr val="632523"/>
+                </a:solidFill>
+                <a:latin typeface="Avenir Roman"/>
+                <a:cs typeface="Avenir Roman"/>
+              </a:rPr>
+              <a:t>LeNet</a:t>
             </a:r>
             <a:endParaRPr lang="en-US" sz="1600" dirty="0" smtClean="0">
               <a:solidFill>
@@ -3620,15 +3642,6 @@
               </a:rPr>
               <a:t>We plan to leverage the framework of Spark and MPI to train 60,000 images of written digits for image recognition.</a:t>
             </a:r>
-            <a:endParaRPr lang="en-US" dirty="0" smtClean="0">
-              <a:solidFill>
-                <a:schemeClr val="tx2">
-                  <a:lumMod val="50000"/>
-                </a:schemeClr>
-              </a:solidFill>
-              <a:latin typeface="Avenir Roman"/>
-              <a:cs typeface="Avenir Roman"/>
-            </a:endParaRPr>
           </a:p>
         </p:txBody>
       </p:sp>
@@ -3688,13 +3701,6 @@
               </a:rPr>
               <a:t>Example image</a:t>
             </a:r>
-            <a:endParaRPr lang="en-US" sz="1600" dirty="0" smtClean="0">
-              <a:solidFill>
-                <a:srgbClr val="632523"/>
-              </a:solidFill>
-              <a:latin typeface="Avenir Roman"/>
-              <a:cs typeface="Avenir Roman"/>
-            </a:endParaRPr>
           </a:p>
         </p:txBody>
       </p:sp>
@@ -3730,13 +3736,6 @@
               </a:rPr>
               <a:t>Have to train 10 separate digits using 60,000 examples</a:t>
             </a:r>
-            <a:endParaRPr lang="en-US" sz="1600" dirty="0" smtClean="0">
-              <a:solidFill>
-                <a:srgbClr val="632523"/>
-              </a:solidFill>
-              <a:latin typeface="Avenir Roman"/>
-              <a:cs typeface="Avenir Roman"/>
-            </a:endParaRPr>
           </a:p>
         </p:txBody>
       </p:sp>
@@ -3804,13 +3803,6 @@
               </a:rPr>
               <a:t>: use MPI to train each digit separately</a:t>
             </a:r>
-            <a:endParaRPr lang="en-US" sz="1600" dirty="0" smtClean="0">
-              <a:solidFill>
-                <a:srgbClr val="632523"/>
-              </a:solidFill>
-              <a:latin typeface="Avenir Roman"/>
-              <a:cs typeface="Avenir Roman"/>
-            </a:endParaRPr>
           </a:p>
         </p:txBody>
       </p:sp>
@@ -3876,29 +3868,8 @@
                 <a:latin typeface="Avenir Roman"/>
                 <a:cs typeface="Avenir Roman"/>
               </a:rPr>
-              <a:t>Project </a:t>
-            </a:r>
-            <a:r>
-              <a:rPr lang="en-US" dirty="0" smtClean="0">
-                <a:solidFill>
-                  <a:schemeClr val="tx2">
-                    <a:lumMod val="50000"/>
-                  </a:schemeClr>
-                </a:solidFill>
-                <a:latin typeface="Avenir Roman"/>
-                <a:cs typeface="Avenir Roman"/>
-              </a:rPr>
-              <a:t>Updates</a:t>
-            </a:r>
-            <a:endParaRPr lang="en-US" dirty="0" smtClean="0">
-              <a:solidFill>
-                <a:schemeClr val="tx2">
-                  <a:lumMod val="50000"/>
-                </a:schemeClr>
-              </a:solidFill>
-              <a:latin typeface="Avenir Roman"/>
-              <a:cs typeface="Avenir Roman"/>
-            </a:endParaRPr>
+              <a:t>Project Updates</a:t>
+            </a:r>
           </a:p>
         </p:txBody>
       </p:sp>
@@ -4222,29 +4193,8 @@
                 <a:latin typeface="Avenir Roman"/>
                 <a:cs typeface="Avenir Roman"/>
               </a:rPr>
-              <a:t>Project </a:t>
-            </a:r>
-            <a:r>
-              <a:rPr lang="en-US" dirty="0" smtClean="0">
-                <a:solidFill>
-                  <a:schemeClr val="tx2">
-                    <a:lumMod val="50000"/>
-                  </a:schemeClr>
-                </a:solidFill>
-                <a:latin typeface="Avenir Roman"/>
-                <a:cs typeface="Avenir Roman"/>
-              </a:rPr>
-              <a:t>Updates</a:t>
-            </a:r>
-            <a:endParaRPr lang="en-US" dirty="0" smtClean="0">
-              <a:solidFill>
-                <a:schemeClr val="tx2">
-                  <a:lumMod val="50000"/>
-                </a:schemeClr>
-              </a:solidFill>
-              <a:latin typeface="Avenir Roman"/>
-              <a:cs typeface="Avenir Roman"/>
-            </a:endParaRPr>
+              <a:t>Project Updates</a:t>
+            </a:r>
           </a:p>
         </p:txBody>
       </p:sp>
@@ -4381,15 +4331,6 @@
               </a:rPr>
               <a:t>Explore data vs. model parallelism</a:t>
             </a:r>
-            <a:endParaRPr lang="en-US" dirty="0" smtClean="0">
-              <a:solidFill>
-                <a:schemeClr val="tx2">
-                  <a:lumMod val="50000"/>
-                </a:schemeClr>
-              </a:solidFill>
-              <a:latin typeface="Avenir Roman"/>
-              <a:cs typeface="Avenir Roman"/>
-            </a:endParaRPr>
           </a:p>
           <a:p>
             <a:endParaRPr lang="en-US" dirty="0">
@@ -4436,13 +4377,6 @@
               </a:rPr>
               <a:t>Needs to be done</a:t>
             </a:r>
-            <a:endParaRPr lang="en-US" dirty="0" smtClean="0">
-              <a:solidFill>
-                <a:srgbClr val="632523"/>
-              </a:solidFill>
-              <a:latin typeface="Avenir Roman"/>
-              <a:cs typeface="Avenir Roman"/>
-            </a:endParaRPr>
           </a:p>
         </p:txBody>
       </p:sp>

</xml_diff>